<commit_message>
chg: turial 7, travis
</commit_message>
<xml_diff>
--- a/tutorial/CWATM_exercise7/cwatm_exercise7.pptx
+++ b/tutorial/CWATM_exercise7/cwatm_exercise7.pptx
@@ -5,7 +5,7 @@
     <p:sldMasterId id="2147483660" r:id="rId1"/>
   </p:sldMasterIdLst>
   <p:notesMasterIdLst>
-    <p:notesMasterId r:id="rId17"/>
+    <p:notesMasterId r:id="rId20"/>
   </p:notesMasterIdLst>
   <p:sldIdLst>
     <p:sldId id="257" r:id="rId2"/>
@@ -17,12 +17,15 @@
     <p:sldId id="2541" r:id="rId8"/>
     <p:sldId id="2562" r:id="rId9"/>
     <p:sldId id="2563" r:id="rId10"/>
-    <p:sldId id="2564" r:id="rId11"/>
-    <p:sldId id="2565" r:id="rId12"/>
-    <p:sldId id="2566" r:id="rId13"/>
-    <p:sldId id="2567" r:id="rId14"/>
-    <p:sldId id="2570" r:id="rId15"/>
-    <p:sldId id="2569" r:id="rId16"/>
+    <p:sldId id="2571" r:id="rId11"/>
+    <p:sldId id="2564" r:id="rId12"/>
+    <p:sldId id="2565" r:id="rId13"/>
+    <p:sldId id="2566" r:id="rId14"/>
+    <p:sldId id="2567" r:id="rId15"/>
+    <p:sldId id="2570" r:id="rId16"/>
+    <p:sldId id="2569" r:id="rId17"/>
+    <p:sldId id="2572" r:id="rId18"/>
+    <p:sldId id="2557" r:id="rId19"/>
   </p:sldIdLst>
   <p:sldSz cx="12192000" cy="6858000"/>
   <p:notesSz cx="6858000" cy="9144000"/>
@@ -234,7 +237,7 @@
           <a:p>
             <a:fld id="{EA2D02D5-C0FE-441E-8F91-6CCDB3F0CBDF}" type="datetimeFigureOut">
               <a:rPr lang="en-US" smtClean="0"/>
-              <a:t>15/12/20</a:t>
+              <a:t>16/12/20</a:t>
             </a:fld>
             <a:endParaRPr lang="en-US"/>
           </a:p>
@@ -744,7 +747,7 @@
     </p:spTree>
     <p:extLst>
       <p:ext uri="{BB962C8B-B14F-4D97-AF65-F5344CB8AC3E}">
-        <p14:creationId xmlns:p14="http://schemas.microsoft.com/office/powerpoint/2010/main" val="3276332981"/>
+        <p14:creationId xmlns:p14="http://schemas.microsoft.com/office/powerpoint/2010/main" val="3360003445"/>
       </p:ext>
     </p:extLst>
   </p:cSld>
@@ -853,7 +856,7 @@
     </p:spTree>
     <p:extLst>
       <p:ext uri="{BB962C8B-B14F-4D97-AF65-F5344CB8AC3E}">
-        <p14:creationId xmlns:p14="http://schemas.microsoft.com/office/powerpoint/2010/main" val="2872210726"/>
+        <p14:creationId xmlns:p14="http://schemas.microsoft.com/office/powerpoint/2010/main" val="3276332981"/>
       </p:ext>
     </p:extLst>
   </p:cSld>
@@ -962,7 +965,7 @@
     </p:spTree>
     <p:extLst>
       <p:ext uri="{BB962C8B-B14F-4D97-AF65-F5344CB8AC3E}">
-        <p14:creationId xmlns:p14="http://schemas.microsoft.com/office/powerpoint/2010/main" val="1124640269"/>
+        <p14:creationId xmlns:p14="http://schemas.microsoft.com/office/powerpoint/2010/main" val="2872210726"/>
       </p:ext>
     </p:extLst>
   </p:cSld>
@@ -1071,7 +1074,7 @@
     </p:spTree>
     <p:extLst>
       <p:ext uri="{BB962C8B-B14F-4D97-AF65-F5344CB8AC3E}">
-        <p14:creationId xmlns:p14="http://schemas.microsoft.com/office/powerpoint/2010/main" val="1010931688"/>
+        <p14:creationId xmlns:p14="http://schemas.microsoft.com/office/powerpoint/2010/main" val="1124640269"/>
       </p:ext>
     </p:extLst>
   </p:cSld>
@@ -1180,7 +1183,7 @@
     </p:spTree>
     <p:extLst>
       <p:ext uri="{BB962C8B-B14F-4D97-AF65-F5344CB8AC3E}">
-        <p14:creationId xmlns:p14="http://schemas.microsoft.com/office/powerpoint/2010/main" val="2464098224"/>
+        <p14:creationId xmlns:p14="http://schemas.microsoft.com/office/powerpoint/2010/main" val="1010931688"/>
       </p:ext>
     </p:extLst>
   </p:cSld>
@@ -1289,7 +1292,334 @@
     </p:spTree>
     <p:extLst>
       <p:ext uri="{BB962C8B-B14F-4D97-AF65-F5344CB8AC3E}">
+        <p14:creationId xmlns:p14="http://schemas.microsoft.com/office/powerpoint/2010/main" val="2464098224"/>
+      </p:ext>
+    </p:extLst>
+  </p:cSld>
+  <p:clrMapOvr>
+    <a:masterClrMapping/>
+  </p:clrMapOvr>
+</p:notes>
+</file>
+
+<file path=ppt/notesSlides/notesSlide16.xml><?xml version="1.0" encoding="utf-8"?>
+<p:notes xmlns:a="http://schemas.openxmlformats.org/drawingml/2006/main" xmlns:r="http://schemas.openxmlformats.org/officeDocument/2006/relationships" xmlns:p="http://schemas.openxmlformats.org/presentationml/2006/main">
+  <p:cSld>
+    <p:spTree>
+      <p:nvGrpSpPr>
+        <p:cNvPr id="1" name=""/>
+        <p:cNvGrpSpPr/>
+        <p:nvPr/>
+      </p:nvGrpSpPr>
+      <p:grpSpPr>
+        <a:xfrm>
+          <a:off x="0" y="0"/>
+          <a:ext cx="0" cy="0"/>
+          <a:chOff x="0" y="0"/>
+          <a:chExt cx="0" cy="0"/>
+        </a:xfrm>
+      </p:grpSpPr>
+      <p:sp>
+        <p:nvSpPr>
+          <p:cNvPr id="2" name="Slide Image Placeholder 1"/>
+          <p:cNvSpPr>
+            <a:spLocks noGrp="1" noRot="1" noChangeAspect="1"/>
+          </p:cNvSpPr>
+          <p:nvPr>
+            <p:ph type="sldImg"/>
+          </p:nvPr>
+        </p:nvSpPr>
+        <p:spPr/>
+      </p:sp>
+      <p:sp>
+        <p:nvSpPr>
+          <p:cNvPr id="3" name="Notes Placeholder 2"/>
+          <p:cNvSpPr>
+            <a:spLocks noGrp="1"/>
+          </p:cNvSpPr>
+          <p:nvPr>
+            <p:ph type="body" idx="1"/>
+          </p:nvPr>
+        </p:nvSpPr>
+        <p:spPr/>
+        <p:txBody>
+          <a:bodyPr/>
+          <a:lstStyle/>
+          <a:p>
+            <a:r>
+              <a:rPr lang="en-US" dirty="0"/>
+              <a:t>Improvement</a:t>
+            </a:r>
+            <a:r>
+              <a:rPr lang="en-US" baseline="0" dirty="0"/>
+              <a:t> in resolution of </a:t>
+            </a:r>
+            <a:r>
+              <a:rPr lang="en-US" baseline="0" dirty="0" err="1"/>
+              <a:t>CWatM</a:t>
+            </a:r>
+            <a:r>
+              <a:rPr lang="en-US" baseline="0" dirty="0"/>
+              <a:t> model for basin analysis to show more details locally. </a:t>
+            </a:r>
+            <a:endParaRPr lang="en-US" dirty="0"/>
+          </a:p>
+        </p:txBody>
+      </p:sp>
+      <p:sp>
+        <p:nvSpPr>
+          <p:cNvPr id="4" name="Slide Number Placeholder 3"/>
+          <p:cNvSpPr>
+            <a:spLocks noGrp="1"/>
+          </p:cNvSpPr>
+          <p:nvPr>
+            <p:ph type="sldNum" sz="quarter" idx="10"/>
+          </p:nvPr>
+        </p:nvSpPr>
+        <p:spPr/>
+        <p:txBody>
+          <a:bodyPr/>
+          <a:lstStyle/>
+          <a:p>
+            <a:fld id="{DB2B29A3-1419-4EB2-AE4E-9ED0ED5E3C34}" type="slidenum">
+              <a:rPr lang="en-US" smtClean="0">
+                <a:solidFill>
+                  <a:prstClr val="black"/>
+                </a:solidFill>
+              </a:rPr>
+              <a:pPr/>
+              <a:t>16</a:t>
+            </a:fld>
+            <a:endParaRPr lang="en-US">
+              <a:solidFill>
+                <a:prstClr val="black"/>
+              </a:solidFill>
+            </a:endParaRPr>
+          </a:p>
+        </p:txBody>
+      </p:sp>
+    </p:spTree>
+    <p:extLst>
+      <p:ext uri="{BB962C8B-B14F-4D97-AF65-F5344CB8AC3E}">
         <p14:creationId xmlns:p14="http://schemas.microsoft.com/office/powerpoint/2010/main" val="2590823469"/>
+      </p:ext>
+    </p:extLst>
+  </p:cSld>
+  <p:clrMapOvr>
+    <a:masterClrMapping/>
+  </p:clrMapOvr>
+</p:notes>
+</file>
+
+<file path=ppt/notesSlides/notesSlide17.xml><?xml version="1.0" encoding="utf-8"?>
+<p:notes xmlns:a="http://schemas.openxmlformats.org/drawingml/2006/main" xmlns:r="http://schemas.openxmlformats.org/officeDocument/2006/relationships" xmlns:p="http://schemas.openxmlformats.org/presentationml/2006/main">
+  <p:cSld>
+    <p:spTree>
+      <p:nvGrpSpPr>
+        <p:cNvPr id="1" name=""/>
+        <p:cNvGrpSpPr/>
+        <p:nvPr/>
+      </p:nvGrpSpPr>
+      <p:grpSpPr>
+        <a:xfrm>
+          <a:off x="0" y="0"/>
+          <a:ext cx="0" cy="0"/>
+          <a:chOff x="0" y="0"/>
+          <a:chExt cx="0" cy="0"/>
+        </a:xfrm>
+      </p:grpSpPr>
+      <p:sp>
+        <p:nvSpPr>
+          <p:cNvPr id="2" name="Slide Image Placeholder 1"/>
+          <p:cNvSpPr>
+            <a:spLocks noGrp="1" noRot="1" noChangeAspect="1"/>
+          </p:cNvSpPr>
+          <p:nvPr>
+            <p:ph type="sldImg"/>
+          </p:nvPr>
+        </p:nvSpPr>
+        <p:spPr/>
+      </p:sp>
+      <p:sp>
+        <p:nvSpPr>
+          <p:cNvPr id="3" name="Notes Placeholder 2"/>
+          <p:cNvSpPr>
+            <a:spLocks noGrp="1"/>
+          </p:cNvSpPr>
+          <p:nvPr>
+            <p:ph type="body" idx="1"/>
+          </p:nvPr>
+        </p:nvSpPr>
+        <p:spPr/>
+        <p:txBody>
+          <a:bodyPr/>
+          <a:lstStyle/>
+          <a:p>
+            <a:r>
+              <a:rPr lang="en-US" dirty="0"/>
+              <a:t>Improvement</a:t>
+            </a:r>
+            <a:r>
+              <a:rPr lang="en-US" baseline="0" dirty="0"/>
+              <a:t> in resolution of </a:t>
+            </a:r>
+            <a:r>
+              <a:rPr lang="en-US" baseline="0" dirty="0" err="1"/>
+              <a:t>CWatM</a:t>
+            </a:r>
+            <a:r>
+              <a:rPr lang="en-US" baseline="0" dirty="0"/>
+              <a:t> model for basin analysis to show more details locally. </a:t>
+            </a:r>
+            <a:endParaRPr lang="en-US" dirty="0"/>
+          </a:p>
+        </p:txBody>
+      </p:sp>
+      <p:sp>
+        <p:nvSpPr>
+          <p:cNvPr id="4" name="Slide Number Placeholder 3"/>
+          <p:cNvSpPr>
+            <a:spLocks noGrp="1"/>
+          </p:cNvSpPr>
+          <p:nvPr>
+            <p:ph type="sldNum" sz="quarter" idx="10"/>
+          </p:nvPr>
+        </p:nvSpPr>
+        <p:spPr/>
+        <p:txBody>
+          <a:bodyPr/>
+          <a:lstStyle/>
+          <a:p>
+            <a:fld id="{DB2B29A3-1419-4EB2-AE4E-9ED0ED5E3C34}" type="slidenum">
+              <a:rPr lang="en-US" smtClean="0">
+                <a:solidFill>
+                  <a:prstClr val="black"/>
+                </a:solidFill>
+              </a:rPr>
+              <a:pPr/>
+              <a:t>17</a:t>
+            </a:fld>
+            <a:endParaRPr lang="en-US">
+              <a:solidFill>
+                <a:prstClr val="black"/>
+              </a:solidFill>
+            </a:endParaRPr>
+          </a:p>
+        </p:txBody>
+      </p:sp>
+    </p:spTree>
+    <p:extLst>
+      <p:ext uri="{BB962C8B-B14F-4D97-AF65-F5344CB8AC3E}">
+        <p14:creationId xmlns:p14="http://schemas.microsoft.com/office/powerpoint/2010/main" val="2392546186"/>
+      </p:ext>
+    </p:extLst>
+  </p:cSld>
+  <p:clrMapOvr>
+    <a:masterClrMapping/>
+  </p:clrMapOvr>
+</p:notes>
+</file>
+
+<file path=ppt/notesSlides/notesSlide18.xml><?xml version="1.0" encoding="utf-8"?>
+<p:notes xmlns:a="http://schemas.openxmlformats.org/drawingml/2006/main" xmlns:r="http://schemas.openxmlformats.org/officeDocument/2006/relationships" xmlns:p="http://schemas.openxmlformats.org/presentationml/2006/main">
+  <p:cSld>
+    <p:spTree>
+      <p:nvGrpSpPr>
+        <p:cNvPr id="1" name=""/>
+        <p:cNvGrpSpPr/>
+        <p:nvPr/>
+      </p:nvGrpSpPr>
+      <p:grpSpPr>
+        <a:xfrm>
+          <a:off x="0" y="0"/>
+          <a:ext cx="0" cy="0"/>
+          <a:chOff x="0" y="0"/>
+          <a:chExt cx="0" cy="0"/>
+        </a:xfrm>
+      </p:grpSpPr>
+      <p:sp>
+        <p:nvSpPr>
+          <p:cNvPr id="2" name="Slide Image Placeholder 1"/>
+          <p:cNvSpPr>
+            <a:spLocks noGrp="1" noRot="1" noChangeAspect="1"/>
+          </p:cNvSpPr>
+          <p:nvPr>
+            <p:ph type="sldImg"/>
+          </p:nvPr>
+        </p:nvSpPr>
+        <p:spPr/>
+      </p:sp>
+      <p:sp>
+        <p:nvSpPr>
+          <p:cNvPr id="3" name="Notes Placeholder 2"/>
+          <p:cNvSpPr>
+            <a:spLocks noGrp="1"/>
+          </p:cNvSpPr>
+          <p:nvPr>
+            <p:ph type="body" idx="1"/>
+          </p:nvPr>
+        </p:nvSpPr>
+        <p:spPr/>
+        <p:txBody>
+          <a:bodyPr/>
+          <a:lstStyle/>
+          <a:p>
+            <a:r>
+              <a:rPr lang="en-US" dirty="0"/>
+              <a:t>Improvement</a:t>
+            </a:r>
+            <a:r>
+              <a:rPr lang="en-US" baseline="0" dirty="0"/>
+              <a:t> in resolution of </a:t>
+            </a:r>
+            <a:r>
+              <a:rPr lang="en-US" baseline="0" dirty="0" err="1"/>
+              <a:t>CWatM</a:t>
+            </a:r>
+            <a:r>
+              <a:rPr lang="en-US" baseline="0" dirty="0"/>
+              <a:t> model for basin analysis to show more details locally. </a:t>
+            </a:r>
+            <a:endParaRPr lang="en-US" dirty="0"/>
+          </a:p>
+        </p:txBody>
+      </p:sp>
+      <p:sp>
+        <p:nvSpPr>
+          <p:cNvPr id="4" name="Slide Number Placeholder 3"/>
+          <p:cNvSpPr>
+            <a:spLocks noGrp="1"/>
+          </p:cNvSpPr>
+          <p:nvPr>
+            <p:ph type="sldNum" sz="quarter" idx="10"/>
+          </p:nvPr>
+        </p:nvSpPr>
+        <p:spPr/>
+        <p:txBody>
+          <a:bodyPr/>
+          <a:lstStyle/>
+          <a:p>
+            <a:fld id="{DB2B29A3-1419-4EB2-AE4E-9ED0ED5E3C34}" type="slidenum">
+              <a:rPr lang="en-US" smtClean="0">
+                <a:solidFill>
+                  <a:prstClr val="black"/>
+                </a:solidFill>
+              </a:rPr>
+              <a:pPr/>
+              <a:t>18</a:t>
+            </a:fld>
+            <a:endParaRPr lang="en-US">
+              <a:solidFill>
+                <a:prstClr val="black"/>
+              </a:solidFill>
+            </a:endParaRPr>
+          </a:p>
+        </p:txBody>
+      </p:sp>
+    </p:spTree>
+    <p:extLst>
+      <p:ext uri="{BB962C8B-B14F-4D97-AF65-F5344CB8AC3E}">
+        <p14:creationId xmlns:p14="http://schemas.microsoft.com/office/powerpoint/2010/main" val="290151916"/>
       </p:ext>
     </p:extLst>
   </p:cSld>
@@ -4865,7 +5195,7 @@
                 <a:tabLst/>
                 <a:defRPr/>
               </a:pPr>
-              <a:t>15/12/20</a:t>
+              <a:t>16/12/20</a:t>
             </a:fld>
             <a:endParaRPr kumimoji="0" lang="en-US" sz="800" b="0" i="0" u="none" strike="noStrike" kern="1200" cap="none" spc="0" normalizeH="0" baseline="0" noProof="0">
               <a:ln>
@@ -12129,6 +12459,624 @@
           <a:chExt cx="0" cy="0"/>
         </a:xfrm>
       </p:grpSpPr>
+      <p:pic>
+        <p:nvPicPr>
+          <p:cNvPr id="9" name="Picture 8">
+            <a:extLst>
+              <a:ext uri="{FF2B5EF4-FFF2-40B4-BE49-F238E27FC236}">
+                <a16:creationId xmlns:a16="http://schemas.microsoft.com/office/drawing/2014/main" id="{07044BD5-21CA-4B0B-8F0D-6B72574616C1}"/>
+              </a:ext>
+            </a:extLst>
+          </p:cNvPr>
+          <p:cNvPicPr>
+            <a:picLocks noChangeAspect="1"/>
+          </p:cNvPicPr>
+          <p:nvPr/>
+        </p:nvPicPr>
+        <p:blipFill>
+          <a:blip r:embed="rId3"/>
+          <a:stretch>
+            <a:fillRect/>
+          </a:stretch>
+        </p:blipFill>
+        <p:spPr>
+          <a:xfrm>
+            <a:off x="557350" y="2926725"/>
+            <a:ext cx="4700107" cy="1436553"/>
+          </a:xfrm>
+          <a:prstGeom prst="rect">
+            <a:avLst/>
+          </a:prstGeom>
+        </p:spPr>
+      </p:pic>
+      <p:sp>
+        <p:nvSpPr>
+          <p:cNvPr id="7" name="Title 6"/>
+          <p:cNvSpPr>
+            <a:spLocks noGrp="1"/>
+          </p:cNvSpPr>
+          <p:nvPr>
+            <p:ph type="title"/>
+          </p:nvPr>
+        </p:nvSpPr>
+        <p:spPr>
+          <a:xfrm>
+            <a:off x="1632370" y="972775"/>
+            <a:ext cx="8229600" cy="1143000"/>
+          </a:xfrm>
+        </p:spPr>
+        <p:txBody>
+          <a:bodyPr>
+            <a:normAutofit fontScale="90000"/>
+          </a:bodyPr>
+          <a:lstStyle/>
+          <a:p>
+            <a:r>
+              <a:rPr lang="en-US" sz="3200" b="0" dirty="0">
+                <a:cs typeface="Calibri" panose="020F0502020204030204" pitchFamily="34" charset="0"/>
+              </a:rPr>
+              <a:t>Options of CWATM </a:t>
+            </a:r>
+            <a:br>
+              <a:rPr lang="en-US" sz="3200" b="0" dirty="0">
+                <a:cs typeface="Calibri" panose="020F0502020204030204" pitchFamily="34" charset="0"/>
+              </a:rPr>
+            </a:br>
+            <a:br>
+              <a:rPr lang="en-US" sz="3200" b="1" dirty="0">
+                <a:cs typeface="Calibri" panose="020F0502020204030204" pitchFamily="34" charset="0"/>
+              </a:rPr>
+            </a:br>
+            <a:br>
+              <a:rPr lang="en-US" sz="3200" b="1" dirty="0">
+                <a:cs typeface="Calibri" panose="020F0502020204030204" pitchFamily="34" charset="0"/>
+              </a:rPr>
+            </a:br>
+            <a:br>
+              <a:rPr lang="en-US" sz="3200" b="1" dirty="0">
+                <a:cs typeface="Calibri" panose="020F0502020204030204" pitchFamily="34" charset="0"/>
+              </a:rPr>
+            </a:br>
+            <a:br>
+              <a:rPr lang="en-US" b="1" dirty="0">
+                <a:solidFill>
+                  <a:sysClr val="windowText" lastClr="000000"/>
+                </a:solidFill>
+              </a:rPr>
+            </a:br>
+            <a:endParaRPr lang="en-US" dirty="0"/>
+          </a:p>
+        </p:txBody>
+      </p:sp>
+      <p:sp>
+        <p:nvSpPr>
+          <p:cNvPr id="3" name="Determine the impact of different policies on the future behavior of some real system…">
+            <a:extLst>
+              <a:ext uri="{FF2B5EF4-FFF2-40B4-BE49-F238E27FC236}">
+                <a16:creationId xmlns:a16="http://schemas.microsoft.com/office/drawing/2014/main" id="{33677E76-ECF5-4F7D-B13A-F372C3169ACE}"/>
+              </a:ext>
+            </a:extLst>
+          </p:cNvPr>
+          <p:cNvSpPr txBox="1">
+            <a:spLocks/>
+          </p:cNvSpPr>
+          <p:nvPr/>
+        </p:nvSpPr>
+        <p:spPr>
+          <a:xfrm>
+            <a:off x="573881" y="1126730"/>
+            <a:ext cx="11146970" cy="5731270"/>
+          </a:xfrm>
+          <a:prstGeom prst="rect">
+            <a:avLst/>
+          </a:prstGeom>
+        </p:spPr>
+        <p:txBody>
+          <a:bodyPr vert="horz" lIns="91440" tIns="45720" rIns="91440" bIns="45720" rtlCol="0">
+            <a:normAutofit/>
+          </a:bodyPr>
+          <a:lstStyle>
+            <a:lvl1pPr marL="228600" indent="-228600" algn="l" defTabSz="914400" rtl="0" eaLnBrk="1" latinLnBrk="0" hangingPunct="1">
+              <a:lnSpc>
+                <a:spcPct val="90000"/>
+              </a:lnSpc>
+              <a:spcBef>
+                <a:spcPts val="1000"/>
+              </a:spcBef>
+              <a:buFont typeface="Arial" panose="020B0604020202020204" pitchFamily="34" charset="0"/>
+              <a:buChar char="•"/>
+              <a:defRPr sz="2800" kern="1200">
+                <a:solidFill>
+                  <a:schemeClr val="tx1"/>
+                </a:solidFill>
+                <a:latin typeface="Tahoma" panose="020B0604030504040204" pitchFamily="34" charset="0"/>
+                <a:ea typeface="Tahoma" panose="020B0604030504040204" pitchFamily="34" charset="0"/>
+                <a:cs typeface="Tahoma" panose="020B0604030504040204" pitchFamily="34" charset="0"/>
+              </a:defRPr>
+            </a:lvl1pPr>
+            <a:lvl2pPr marL="685800" indent="-228600" algn="l" defTabSz="914400" rtl="0" eaLnBrk="1" latinLnBrk="0" hangingPunct="1">
+              <a:lnSpc>
+                <a:spcPct val="90000"/>
+              </a:lnSpc>
+              <a:spcBef>
+                <a:spcPts val="500"/>
+              </a:spcBef>
+              <a:buFont typeface="Arial" panose="020B0604020202020204" pitchFamily="34" charset="0"/>
+              <a:buChar char="•"/>
+              <a:defRPr sz="2400" b="0" kern="1200">
+                <a:solidFill>
+                  <a:schemeClr val="tx1"/>
+                </a:solidFill>
+                <a:latin typeface="Tahoma" panose="020B0604030504040204" pitchFamily="34" charset="0"/>
+                <a:ea typeface="Tahoma" panose="020B0604030504040204" pitchFamily="34" charset="0"/>
+                <a:cs typeface="Tahoma" panose="020B0604030504040204" pitchFamily="34" charset="0"/>
+              </a:defRPr>
+            </a:lvl2pPr>
+            <a:lvl3pPr marL="1143000" indent="-228600" algn="l" defTabSz="914400" rtl="0" eaLnBrk="1" latinLnBrk="0" hangingPunct="1">
+              <a:lnSpc>
+                <a:spcPct val="90000"/>
+              </a:lnSpc>
+              <a:spcBef>
+                <a:spcPts val="500"/>
+              </a:spcBef>
+              <a:buFont typeface="Arial" panose="020B0604020202020204" pitchFamily="34" charset="0"/>
+              <a:buChar char="•"/>
+              <a:defRPr sz="2000" kern="1200">
+                <a:solidFill>
+                  <a:schemeClr val="tx1"/>
+                </a:solidFill>
+                <a:latin typeface="Tahoma" panose="020B0604030504040204" pitchFamily="34" charset="0"/>
+                <a:ea typeface="Tahoma" panose="020B0604030504040204" pitchFamily="34" charset="0"/>
+                <a:cs typeface="Tahoma" panose="020B0604030504040204" pitchFamily="34" charset="0"/>
+              </a:defRPr>
+            </a:lvl3pPr>
+            <a:lvl4pPr marL="1600200" indent="-228600" algn="l" defTabSz="914400" rtl="0" eaLnBrk="1" latinLnBrk="0" hangingPunct="1">
+              <a:lnSpc>
+                <a:spcPct val="90000"/>
+              </a:lnSpc>
+              <a:spcBef>
+                <a:spcPts val="500"/>
+              </a:spcBef>
+              <a:buFont typeface="Arial" panose="020B0604020202020204" pitchFamily="34" charset="0"/>
+              <a:buChar char="•"/>
+              <a:defRPr sz="1800" kern="1200">
+                <a:solidFill>
+                  <a:schemeClr val="tx1"/>
+                </a:solidFill>
+                <a:latin typeface="Tahoma" panose="020B0604030504040204" pitchFamily="34" charset="0"/>
+                <a:ea typeface="Tahoma" panose="020B0604030504040204" pitchFamily="34" charset="0"/>
+                <a:cs typeface="Tahoma" panose="020B0604030504040204" pitchFamily="34" charset="0"/>
+              </a:defRPr>
+            </a:lvl4pPr>
+            <a:lvl5pPr marL="2057400" indent="-228600" algn="l" defTabSz="914400" rtl="0" eaLnBrk="1" latinLnBrk="0" hangingPunct="1">
+              <a:lnSpc>
+                <a:spcPct val="90000"/>
+              </a:lnSpc>
+              <a:spcBef>
+                <a:spcPts val="500"/>
+              </a:spcBef>
+              <a:buFont typeface="Arial" panose="020B0604020202020204" pitchFamily="34" charset="0"/>
+              <a:buChar char="•"/>
+              <a:defRPr sz="1800" kern="1200">
+                <a:solidFill>
+                  <a:schemeClr val="tx1"/>
+                </a:solidFill>
+                <a:latin typeface="Tahoma" panose="020B0604030504040204" pitchFamily="34" charset="0"/>
+                <a:ea typeface="Tahoma" panose="020B0604030504040204" pitchFamily="34" charset="0"/>
+                <a:cs typeface="Tahoma" panose="020B0604030504040204" pitchFamily="34" charset="0"/>
+              </a:defRPr>
+            </a:lvl5pPr>
+            <a:lvl6pPr marL="2514600" indent="-228600" algn="l" defTabSz="914400" rtl="0" eaLnBrk="1" latinLnBrk="0" hangingPunct="1">
+              <a:lnSpc>
+                <a:spcPct val="90000"/>
+              </a:lnSpc>
+              <a:spcBef>
+                <a:spcPts val="500"/>
+              </a:spcBef>
+              <a:buFont typeface="Arial" panose="020B0604020202020204" pitchFamily="34" charset="0"/>
+              <a:buChar char="•"/>
+              <a:defRPr sz="1800" kern="1200">
+                <a:solidFill>
+                  <a:schemeClr val="tx1"/>
+                </a:solidFill>
+                <a:latin typeface="+mn-lt"/>
+                <a:ea typeface="+mn-ea"/>
+                <a:cs typeface="+mn-cs"/>
+              </a:defRPr>
+            </a:lvl6pPr>
+            <a:lvl7pPr marL="2971800" indent="-228600" algn="l" defTabSz="914400" rtl="0" eaLnBrk="1" latinLnBrk="0" hangingPunct="1">
+              <a:lnSpc>
+                <a:spcPct val="90000"/>
+              </a:lnSpc>
+              <a:spcBef>
+                <a:spcPts val="500"/>
+              </a:spcBef>
+              <a:buFont typeface="Arial" panose="020B0604020202020204" pitchFamily="34" charset="0"/>
+              <a:buChar char="•"/>
+              <a:defRPr sz="1800" kern="1200">
+                <a:solidFill>
+                  <a:schemeClr val="tx1"/>
+                </a:solidFill>
+                <a:latin typeface="+mn-lt"/>
+                <a:ea typeface="+mn-ea"/>
+                <a:cs typeface="+mn-cs"/>
+              </a:defRPr>
+            </a:lvl7pPr>
+            <a:lvl8pPr marL="3429000" indent="-228600" algn="l" defTabSz="914400" rtl="0" eaLnBrk="1" latinLnBrk="0" hangingPunct="1">
+              <a:lnSpc>
+                <a:spcPct val="90000"/>
+              </a:lnSpc>
+              <a:spcBef>
+                <a:spcPts val="500"/>
+              </a:spcBef>
+              <a:buFont typeface="Arial" panose="020B0604020202020204" pitchFamily="34" charset="0"/>
+              <a:buChar char="•"/>
+              <a:defRPr sz="1800" kern="1200">
+                <a:solidFill>
+                  <a:schemeClr val="tx1"/>
+                </a:solidFill>
+                <a:latin typeface="+mn-lt"/>
+                <a:ea typeface="+mn-ea"/>
+                <a:cs typeface="+mn-cs"/>
+              </a:defRPr>
+            </a:lvl8pPr>
+            <a:lvl9pPr marL="3886200" indent="-228600" algn="l" defTabSz="914400" rtl="0" eaLnBrk="1" latinLnBrk="0" hangingPunct="1">
+              <a:lnSpc>
+                <a:spcPct val="90000"/>
+              </a:lnSpc>
+              <a:spcBef>
+                <a:spcPts val="500"/>
+              </a:spcBef>
+              <a:buFont typeface="Arial" panose="020B0604020202020204" pitchFamily="34" charset="0"/>
+              <a:buChar char="•"/>
+              <a:defRPr sz="1800" kern="1200">
+                <a:solidFill>
+                  <a:schemeClr val="tx1"/>
+                </a:solidFill>
+                <a:latin typeface="+mn-lt"/>
+                <a:ea typeface="+mn-ea"/>
+                <a:cs typeface="+mn-cs"/>
+              </a:defRPr>
+            </a:lvl9pPr>
+          </a:lstStyle>
+          <a:p>
+            <a:pPr marL="514350" indent="-514350" defTabSz="457200">
+              <a:lnSpc>
+                <a:spcPct val="150000"/>
+              </a:lnSpc>
+              <a:spcBef>
+                <a:spcPts val="600"/>
+              </a:spcBef>
+              <a:buAutoNum type="arabicPeriod"/>
+              <a:defRPr sz="2800"/>
+            </a:pPr>
+            <a:r>
+              <a:rPr lang="en-US" dirty="0"/>
+              <a:t>Running a warm start</a:t>
+            </a:r>
+          </a:p>
+          <a:p>
+            <a:pPr marL="0" indent="0" defTabSz="457200">
+              <a:lnSpc>
+                <a:spcPct val="150000"/>
+              </a:lnSpc>
+              <a:spcBef>
+                <a:spcPts val="600"/>
+              </a:spcBef>
+              <a:buNone/>
+              <a:defRPr sz="2800"/>
+            </a:pPr>
+            <a:r>
+              <a:rPr lang="en-US" sz="2000" dirty="0"/>
+              <a:t>Defining a spin up date:</a:t>
+            </a:r>
+          </a:p>
+          <a:p>
+            <a:pPr marL="0" indent="0" defTabSz="457200">
+              <a:lnSpc>
+                <a:spcPct val="150000"/>
+              </a:lnSpc>
+              <a:spcBef>
+                <a:spcPts val="600"/>
+              </a:spcBef>
+              <a:buNone/>
+              <a:defRPr sz="2800"/>
+            </a:pPr>
+            <a:r>
+              <a:rPr lang="en-US" sz="2000" dirty="0"/>
+              <a:t>Only after this date output variables are generated</a:t>
+            </a:r>
+          </a:p>
+          <a:p>
+            <a:pPr marL="514350" indent="-514350" defTabSz="457200">
+              <a:lnSpc>
+                <a:spcPct val="150000"/>
+              </a:lnSpc>
+              <a:spcBef>
+                <a:spcPts val="600"/>
+              </a:spcBef>
+              <a:buAutoNum type="arabicPeriod"/>
+              <a:defRPr sz="2800"/>
+            </a:pPr>
+            <a:endParaRPr lang="en-US" dirty="0"/>
+          </a:p>
+          <a:p>
+            <a:pPr marL="0" indent="0" defTabSz="457200">
+              <a:lnSpc>
+                <a:spcPct val="150000"/>
+              </a:lnSpc>
+              <a:spcBef>
+                <a:spcPts val="600"/>
+              </a:spcBef>
+              <a:buNone/>
+              <a:defRPr sz="2800"/>
+            </a:pPr>
+            <a:endParaRPr lang="en-US" sz="2000" dirty="0"/>
+          </a:p>
+          <a:p>
+            <a:pPr marL="0" indent="0" defTabSz="457200">
+              <a:lnSpc>
+                <a:spcPct val="150000"/>
+              </a:lnSpc>
+              <a:spcBef>
+                <a:spcPts val="600"/>
+              </a:spcBef>
+              <a:buNone/>
+              <a:defRPr sz="2800"/>
+            </a:pPr>
+            <a:endParaRPr lang="en-US" dirty="0"/>
+          </a:p>
+        </p:txBody>
+      </p:sp>
+      <p:sp>
+        <p:nvSpPr>
+          <p:cNvPr id="6" name="TextBox 5">
+            <a:extLst>
+              <a:ext uri="{FF2B5EF4-FFF2-40B4-BE49-F238E27FC236}">
+                <a16:creationId xmlns:a16="http://schemas.microsoft.com/office/drawing/2014/main" id="{81AE1A94-D81B-412F-A2B2-A5B37F85C633}"/>
+              </a:ext>
+            </a:extLst>
+          </p:cNvPr>
+          <p:cNvSpPr txBox="1"/>
+          <p:nvPr/>
+        </p:nvSpPr>
+        <p:spPr>
+          <a:xfrm>
+            <a:off x="5083435" y="4130899"/>
+            <a:ext cx="6903156" cy="2308324"/>
+          </a:xfrm>
+          <a:prstGeom prst="rect">
+            <a:avLst/>
+          </a:prstGeom>
+          <a:noFill/>
+        </p:spPr>
+        <p:txBody>
+          <a:bodyPr wrap="square" rtlCol="0">
+            <a:spAutoFit/>
+          </a:bodyPr>
+          <a:lstStyle/>
+          <a:p>
+            <a:r>
+              <a:rPr lang="en-US" dirty="0"/>
+              <a:t>Spin up date is defined to 1/1/1999</a:t>
+            </a:r>
+          </a:p>
+          <a:p>
+            <a:r>
+              <a:rPr lang="en-US" dirty="0"/>
+              <a:t>From this date all output timeseries and </a:t>
+            </a:r>
+            <a:r>
+              <a:rPr lang="en-US" dirty="0" err="1"/>
+              <a:t>netCDFs</a:t>
+            </a:r>
+            <a:r>
+              <a:rPr lang="en-US" dirty="0"/>
+              <a:t> are generated</a:t>
+            </a:r>
+          </a:p>
+          <a:p>
+            <a:endParaRPr lang="en-US" dirty="0"/>
+          </a:p>
+          <a:p>
+            <a:r>
+              <a:rPr lang="en-US" dirty="0"/>
+              <a:t>For calibration warm up and </a:t>
+            </a:r>
+            <a:r>
+              <a:rPr lang="en-US" dirty="0" err="1"/>
+              <a:t>spinup</a:t>
+            </a:r>
+            <a:r>
+              <a:rPr lang="en-US" dirty="0"/>
+              <a:t> is used together:</a:t>
+            </a:r>
+          </a:p>
+          <a:p>
+            <a:pPr marL="285750" indent="-285750">
+              <a:buFontTx/>
+              <a:buChar char="-"/>
+            </a:pPr>
+            <a:r>
+              <a:rPr lang="en-US" dirty="0"/>
+              <a:t>warm up of a few decades to have a long time for groundwater and lakes to get into steady state</a:t>
+            </a:r>
+          </a:p>
+          <a:p>
+            <a:pPr marL="285750" indent="-285750">
+              <a:buFontTx/>
+              <a:buChar char="-"/>
+            </a:pPr>
+            <a:r>
+              <a:rPr lang="en-US" dirty="0"/>
+              <a:t>For each calibration run a </a:t>
+            </a:r>
+            <a:r>
+              <a:rPr lang="en-US" dirty="0" err="1"/>
+              <a:t>spinup</a:t>
+            </a:r>
+            <a:r>
+              <a:rPr lang="en-US" dirty="0"/>
+              <a:t> of a few years to get used to the change of calibration parameter</a:t>
+            </a:r>
+          </a:p>
+        </p:txBody>
+      </p:sp>
+      <p:sp>
+        <p:nvSpPr>
+          <p:cNvPr id="5" name="Rectangle 4">
+            <a:extLst>
+              <a:ext uri="{FF2B5EF4-FFF2-40B4-BE49-F238E27FC236}">
+                <a16:creationId xmlns:a16="http://schemas.microsoft.com/office/drawing/2014/main" id="{007B6314-483B-4A17-910C-14BEFF3A3A5D}"/>
+              </a:ext>
+            </a:extLst>
+          </p:cNvPr>
+          <p:cNvSpPr/>
+          <p:nvPr/>
+        </p:nvSpPr>
+        <p:spPr>
+          <a:xfrm>
+            <a:off x="573881" y="3992365"/>
+            <a:ext cx="3162300" cy="109258"/>
+          </a:xfrm>
+          <a:prstGeom prst="rect">
+            <a:avLst/>
+          </a:prstGeom>
+          <a:solidFill>
+            <a:schemeClr val="accent1">
+              <a:alpha val="39000"/>
+            </a:schemeClr>
+          </a:solidFill>
+        </p:spPr>
+        <p:style>
+          <a:lnRef idx="2">
+            <a:schemeClr val="accent1">
+              <a:shade val="50000"/>
+            </a:schemeClr>
+          </a:lnRef>
+          <a:fillRef idx="1">
+            <a:schemeClr val="accent1"/>
+          </a:fillRef>
+          <a:effectRef idx="0">
+            <a:schemeClr val="accent1"/>
+          </a:effectRef>
+          <a:fontRef idx="minor">
+            <a:schemeClr val="lt1"/>
+          </a:fontRef>
+        </p:style>
+        <p:txBody>
+          <a:bodyPr rtlCol="0" anchor="ctr"/>
+          <a:lstStyle/>
+          <a:p>
+            <a:pPr algn="ctr"/>
+            <a:endParaRPr lang="en-US"/>
+          </a:p>
+        </p:txBody>
+      </p:sp>
+      <p:pic>
+        <p:nvPicPr>
+          <p:cNvPr id="16" name="Picture 15">
+            <a:extLst>
+              <a:ext uri="{FF2B5EF4-FFF2-40B4-BE49-F238E27FC236}">
+                <a16:creationId xmlns:a16="http://schemas.microsoft.com/office/drawing/2014/main" id="{A7EA530B-A79A-4D28-92BF-A3F0C337583A}"/>
+              </a:ext>
+            </a:extLst>
+          </p:cNvPr>
+          <p:cNvPicPr>
+            <a:picLocks noChangeAspect="1"/>
+          </p:cNvPicPr>
+          <p:nvPr/>
+        </p:nvPicPr>
+        <p:blipFill>
+          <a:blip r:embed="rId4"/>
+          <a:stretch>
+            <a:fillRect/>
+          </a:stretch>
+        </p:blipFill>
+        <p:spPr>
+          <a:xfrm>
+            <a:off x="573881" y="4969415"/>
+            <a:ext cx="2424485" cy="472887"/>
+          </a:xfrm>
+          <a:prstGeom prst="rect">
+            <a:avLst/>
+          </a:prstGeom>
+        </p:spPr>
+      </p:pic>
+      <p:cxnSp>
+        <p:nvCxnSpPr>
+          <p:cNvPr id="8" name="Straight Arrow Connector 7">
+            <a:extLst>
+              <a:ext uri="{FF2B5EF4-FFF2-40B4-BE49-F238E27FC236}">
+                <a16:creationId xmlns:a16="http://schemas.microsoft.com/office/drawing/2014/main" id="{F60FAED7-B2DD-490F-B3CF-16250D687A1D}"/>
+              </a:ext>
+            </a:extLst>
+          </p:cNvPr>
+          <p:cNvCxnSpPr>
+            <a:cxnSpLocks/>
+          </p:cNvCxnSpPr>
+          <p:nvPr/>
+        </p:nvCxnSpPr>
+        <p:spPr>
+          <a:xfrm flipH="1">
+            <a:off x="2806710" y="4347846"/>
+            <a:ext cx="2276725" cy="905896"/>
+          </a:xfrm>
+          <a:prstGeom prst="straightConnector1">
+            <a:avLst/>
+          </a:prstGeom>
+          <a:ln>
+            <a:solidFill>
+              <a:srgbClr val="C00000"/>
+            </a:solidFill>
+            <a:tailEnd type="triangle"/>
+          </a:ln>
+        </p:spPr>
+        <p:style>
+          <a:lnRef idx="3">
+            <a:schemeClr val="accent5"/>
+          </a:lnRef>
+          <a:fillRef idx="0">
+            <a:schemeClr val="accent5"/>
+          </a:fillRef>
+          <a:effectRef idx="2">
+            <a:schemeClr val="accent5"/>
+          </a:effectRef>
+          <a:fontRef idx="minor">
+            <a:schemeClr val="tx1"/>
+          </a:fontRef>
+        </p:style>
+      </p:cxnSp>
+    </p:spTree>
+    <p:extLst>
+      <p:ext uri="{BB962C8B-B14F-4D97-AF65-F5344CB8AC3E}">
+        <p14:creationId xmlns:p14="http://schemas.microsoft.com/office/powerpoint/2010/main" val="4157012646"/>
+      </p:ext>
+    </p:extLst>
+  </p:cSld>
+  <p:clrMapOvr>
+    <a:masterClrMapping/>
+  </p:clrMapOvr>
+</p:sld>
+</file>
+
+<file path=ppt/slides/slide11.xml><?xml version="1.0" encoding="utf-8"?>
+<p:sld xmlns:a="http://schemas.openxmlformats.org/drawingml/2006/main" xmlns:r="http://schemas.openxmlformats.org/officeDocument/2006/relationships" xmlns:p="http://schemas.openxmlformats.org/presentationml/2006/main">
+  <p:cSld>
+    <p:spTree>
+      <p:nvGrpSpPr>
+        <p:cNvPr id="1" name=""/>
+        <p:cNvGrpSpPr/>
+        <p:nvPr/>
+      </p:nvGrpSpPr>
+      <p:grpSpPr>
+        <a:xfrm>
+          <a:off x="0" y="0"/>
+          <a:ext cx="0" cy="0"/>
+          <a:chOff x="0" y="0"/>
+          <a:chExt cx="0" cy="0"/>
+        </a:xfrm>
+      </p:grpSpPr>
       <p:sp>
         <p:nvSpPr>
           <p:cNvPr id="7" name="Title 6"/>
@@ -12751,7 +13699,7 @@
 </p:sld>
 </file>
 
-<file path=ppt/slides/slide11.xml><?xml version="1.0" encoding="utf-8"?>
+<file path=ppt/slides/slide12.xml><?xml version="1.0" encoding="utf-8"?>
 <p:sld xmlns:a="http://schemas.openxmlformats.org/drawingml/2006/main" xmlns:r="http://schemas.openxmlformats.org/officeDocument/2006/relationships" xmlns:p="http://schemas.openxmlformats.org/presentationml/2006/main">
   <p:cSld>
     <p:spTree>
@@ -13331,7 +14279,7 @@
 </p:sld>
 </file>
 
-<file path=ppt/slides/slide12.xml><?xml version="1.0" encoding="utf-8"?>
+<file path=ppt/slides/slide13.xml><?xml version="1.0" encoding="utf-8"?>
 <p:sld xmlns:a="http://schemas.openxmlformats.org/drawingml/2006/main" xmlns:r="http://schemas.openxmlformats.org/officeDocument/2006/relationships" xmlns:p="http://schemas.openxmlformats.org/presentationml/2006/main">
   <p:cSld>
     <p:spTree>
@@ -13893,7 +14841,7 @@
 </p:sld>
 </file>
 
-<file path=ppt/slides/slide13.xml><?xml version="1.0" encoding="utf-8"?>
+<file path=ppt/slides/slide14.xml><?xml version="1.0" encoding="utf-8"?>
 <p:sld xmlns:a="http://schemas.openxmlformats.org/drawingml/2006/main" xmlns:r="http://schemas.openxmlformats.org/officeDocument/2006/relationships" xmlns:p="http://schemas.openxmlformats.org/presentationml/2006/main">
   <p:cSld>
     <p:spTree>
@@ -14609,7 +15557,7 @@
 </p:sld>
 </file>
 
-<file path=ppt/slides/slide14.xml><?xml version="1.0" encoding="utf-8"?>
+<file path=ppt/slides/slide15.xml><?xml version="1.0" encoding="utf-8"?>
 <p:sld xmlns:a="http://schemas.openxmlformats.org/drawingml/2006/main" xmlns:r="http://schemas.openxmlformats.org/officeDocument/2006/relationships" xmlns:p="http://schemas.openxmlformats.org/presentationml/2006/main">
   <p:cSld>
     <p:spTree>
@@ -15478,7 +16426,7 @@
 </p:sld>
 </file>
 
-<file path=ppt/slides/slide15.xml><?xml version="1.0" encoding="utf-8"?>
+<file path=ppt/slides/slide16.xml><?xml version="1.0" encoding="utf-8"?>
 <p:sld xmlns:a="http://schemas.openxmlformats.org/drawingml/2006/main" xmlns:r="http://schemas.openxmlformats.org/officeDocument/2006/relationships" xmlns:p="http://schemas.openxmlformats.org/presentationml/2006/main">
   <p:cSld>
     <p:spTree>
@@ -16028,6 +16976,1300 @@
     <p:extLst>
       <p:ext uri="{BB962C8B-B14F-4D97-AF65-F5344CB8AC3E}">
         <p14:creationId xmlns:p14="http://schemas.microsoft.com/office/powerpoint/2010/main" val="2080972271"/>
+      </p:ext>
+    </p:extLst>
+  </p:cSld>
+  <p:clrMapOvr>
+    <a:masterClrMapping/>
+  </p:clrMapOvr>
+</p:sld>
+</file>
+
+<file path=ppt/slides/slide17.xml><?xml version="1.0" encoding="utf-8"?>
+<p:sld xmlns:a="http://schemas.openxmlformats.org/drawingml/2006/main" xmlns:r="http://schemas.openxmlformats.org/officeDocument/2006/relationships" xmlns:p="http://schemas.openxmlformats.org/presentationml/2006/main">
+  <p:cSld>
+    <p:spTree>
+      <p:nvGrpSpPr>
+        <p:cNvPr id="1" name=""/>
+        <p:cNvGrpSpPr/>
+        <p:nvPr/>
+      </p:nvGrpSpPr>
+      <p:grpSpPr>
+        <a:xfrm>
+          <a:off x="0" y="0"/>
+          <a:ext cx="0" cy="0"/>
+          <a:chOff x="0" y="0"/>
+          <a:chExt cx="0" cy="0"/>
+        </a:xfrm>
+      </p:grpSpPr>
+      <p:sp>
+        <p:nvSpPr>
+          <p:cNvPr id="7" name="Title 6"/>
+          <p:cNvSpPr>
+            <a:spLocks noGrp="1"/>
+          </p:cNvSpPr>
+          <p:nvPr>
+            <p:ph type="title"/>
+          </p:nvPr>
+        </p:nvSpPr>
+        <p:spPr>
+          <a:xfrm>
+            <a:off x="545692" y="972775"/>
+            <a:ext cx="8229600" cy="1143000"/>
+          </a:xfrm>
+        </p:spPr>
+        <p:txBody>
+          <a:bodyPr>
+            <a:normAutofit fontScale="90000"/>
+          </a:bodyPr>
+          <a:lstStyle/>
+          <a:p>
+            <a:r>
+              <a:rPr lang="en-US" sz="3200" b="0" dirty="0">
+                <a:cs typeface="Calibri" panose="020F0502020204030204" pitchFamily="34" charset="0"/>
+              </a:rPr>
+              <a:t>Hands on </a:t>
+            </a:r>
+            <a:r>
+              <a:rPr lang="en-US" sz="3200" b="0" dirty="0" err="1">
+                <a:cs typeface="Calibri" panose="020F0502020204030204" pitchFamily="34" charset="0"/>
+              </a:rPr>
+              <a:t>CWatM</a:t>
+            </a:r>
+            <a:br>
+              <a:rPr lang="en-US" sz="3200" b="0" dirty="0">
+                <a:cs typeface="Calibri" panose="020F0502020204030204" pitchFamily="34" charset="0"/>
+              </a:rPr>
+            </a:br>
+            <a:br>
+              <a:rPr lang="en-US" sz="3200" b="1" dirty="0">
+                <a:cs typeface="Calibri" panose="020F0502020204030204" pitchFamily="34" charset="0"/>
+              </a:rPr>
+            </a:br>
+            <a:br>
+              <a:rPr lang="en-US" sz="3200" b="1" dirty="0">
+                <a:cs typeface="Calibri" panose="020F0502020204030204" pitchFamily="34" charset="0"/>
+              </a:rPr>
+            </a:br>
+            <a:br>
+              <a:rPr lang="en-US" b="1" dirty="0">
+                <a:solidFill>
+                  <a:sysClr val="windowText" lastClr="000000"/>
+                </a:solidFill>
+              </a:rPr>
+            </a:br>
+            <a:endParaRPr lang="en-US" dirty="0"/>
+          </a:p>
+        </p:txBody>
+      </p:sp>
+      <p:sp>
+        <p:nvSpPr>
+          <p:cNvPr id="3" name="Determine the impact of different policies on the future behavior of some real system…">
+            <a:extLst>
+              <a:ext uri="{FF2B5EF4-FFF2-40B4-BE49-F238E27FC236}">
+                <a16:creationId xmlns:a16="http://schemas.microsoft.com/office/drawing/2014/main" id="{33677E76-ECF5-4F7D-B13A-F372C3169ACE}"/>
+              </a:ext>
+            </a:extLst>
+          </p:cNvPr>
+          <p:cNvSpPr txBox="1">
+            <a:spLocks/>
+          </p:cNvSpPr>
+          <p:nvPr/>
+        </p:nvSpPr>
+        <p:spPr>
+          <a:xfrm>
+            <a:off x="545692" y="1126729"/>
+            <a:ext cx="11193462" cy="4334769"/>
+          </a:xfrm>
+          <a:prstGeom prst="rect">
+            <a:avLst/>
+          </a:prstGeom>
+        </p:spPr>
+        <p:txBody>
+          <a:bodyPr vert="horz" lIns="91440" tIns="45720" rIns="91440" bIns="45720" rtlCol="0">
+            <a:normAutofit/>
+          </a:bodyPr>
+          <a:lstStyle>
+            <a:lvl1pPr marL="228600" indent="-228600" algn="l" defTabSz="914400" rtl="0" eaLnBrk="1" latinLnBrk="0" hangingPunct="1">
+              <a:lnSpc>
+                <a:spcPct val="90000"/>
+              </a:lnSpc>
+              <a:spcBef>
+                <a:spcPts val="1000"/>
+              </a:spcBef>
+              <a:buFont typeface="Arial" panose="020B0604020202020204" pitchFamily="34" charset="0"/>
+              <a:buChar char="•"/>
+              <a:defRPr sz="2800" kern="1200">
+                <a:solidFill>
+                  <a:schemeClr val="tx1"/>
+                </a:solidFill>
+                <a:latin typeface="Tahoma" panose="020B0604030504040204" pitchFamily="34" charset="0"/>
+                <a:ea typeface="Tahoma" panose="020B0604030504040204" pitchFamily="34" charset="0"/>
+                <a:cs typeface="Tahoma" panose="020B0604030504040204" pitchFamily="34" charset="0"/>
+              </a:defRPr>
+            </a:lvl1pPr>
+            <a:lvl2pPr marL="685800" indent="-228600" algn="l" defTabSz="914400" rtl="0" eaLnBrk="1" latinLnBrk="0" hangingPunct="1">
+              <a:lnSpc>
+                <a:spcPct val="90000"/>
+              </a:lnSpc>
+              <a:spcBef>
+                <a:spcPts val="500"/>
+              </a:spcBef>
+              <a:buFont typeface="Arial" panose="020B0604020202020204" pitchFamily="34" charset="0"/>
+              <a:buChar char="•"/>
+              <a:defRPr sz="2400" b="0" kern="1200">
+                <a:solidFill>
+                  <a:schemeClr val="tx1"/>
+                </a:solidFill>
+                <a:latin typeface="Tahoma" panose="020B0604030504040204" pitchFamily="34" charset="0"/>
+                <a:ea typeface="Tahoma" panose="020B0604030504040204" pitchFamily="34" charset="0"/>
+                <a:cs typeface="Tahoma" panose="020B0604030504040204" pitchFamily="34" charset="0"/>
+              </a:defRPr>
+            </a:lvl2pPr>
+            <a:lvl3pPr marL="1143000" indent="-228600" algn="l" defTabSz="914400" rtl="0" eaLnBrk="1" latinLnBrk="0" hangingPunct="1">
+              <a:lnSpc>
+                <a:spcPct val="90000"/>
+              </a:lnSpc>
+              <a:spcBef>
+                <a:spcPts val="500"/>
+              </a:spcBef>
+              <a:buFont typeface="Arial" panose="020B0604020202020204" pitchFamily="34" charset="0"/>
+              <a:buChar char="•"/>
+              <a:defRPr sz="2000" kern="1200">
+                <a:solidFill>
+                  <a:schemeClr val="tx1"/>
+                </a:solidFill>
+                <a:latin typeface="Tahoma" panose="020B0604030504040204" pitchFamily="34" charset="0"/>
+                <a:ea typeface="Tahoma" panose="020B0604030504040204" pitchFamily="34" charset="0"/>
+                <a:cs typeface="Tahoma" panose="020B0604030504040204" pitchFamily="34" charset="0"/>
+              </a:defRPr>
+            </a:lvl3pPr>
+            <a:lvl4pPr marL="1600200" indent="-228600" algn="l" defTabSz="914400" rtl="0" eaLnBrk="1" latinLnBrk="0" hangingPunct="1">
+              <a:lnSpc>
+                <a:spcPct val="90000"/>
+              </a:lnSpc>
+              <a:spcBef>
+                <a:spcPts val="500"/>
+              </a:spcBef>
+              <a:buFont typeface="Arial" panose="020B0604020202020204" pitchFamily="34" charset="0"/>
+              <a:buChar char="•"/>
+              <a:defRPr sz="1800" kern="1200">
+                <a:solidFill>
+                  <a:schemeClr val="tx1"/>
+                </a:solidFill>
+                <a:latin typeface="Tahoma" panose="020B0604030504040204" pitchFamily="34" charset="0"/>
+                <a:ea typeface="Tahoma" panose="020B0604030504040204" pitchFamily="34" charset="0"/>
+                <a:cs typeface="Tahoma" panose="020B0604030504040204" pitchFamily="34" charset="0"/>
+              </a:defRPr>
+            </a:lvl4pPr>
+            <a:lvl5pPr marL="2057400" indent="-228600" algn="l" defTabSz="914400" rtl="0" eaLnBrk="1" latinLnBrk="0" hangingPunct="1">
+              <a:lnSpc>
+                <a:spcPct val="90000"/>
+              </a:lnSpc>
+              <a:spcBef>
+                <a:spcPts val="500"/>
+              </a:spcBef>
+              <a:buFont typeface="Arial" panose="020B0604020202020204" pitchFamily="34" charset="0"/>
+              <a:buChar char="•"/>
+              <a:defRPr sz="1800" kern="1200">
+                <a:solidFill>
+                  <a:schemeClr val="tx1"/>
+                </a:solidFill>
+                <a:latin typeface="Tahoma" panose="020B0604030504040204" pitchFamily="34" charset="0"/>
+                <a:ea typeface="Tahoma" panose="020B0604030504040204" pitchFamily="34" charset="0"/>
+                <a:cs typeface="Tahoma" panose="020B0604030504040204" pitchFamily="34" charset="0"/>
+              </a:defRPr>
+            </a:lvl5pPr>
+            <a:lvl6pPr marL="2514600" indent="-228600" algn="l" defTabSz="914400" rtl="0" eaLnBrk="1" latinLnBrk="0" hangingPunct="1">
+              <a:lnSpc>
+                <a:spcPct val="90000"/>
+              </a:lnSpc>
+              <a:spcBef>
+                <a:spcPts val="500"/>
+              </a:spcBef>
+              <a:buFont typeface="Arial" panose="020B0604020202020204" pitchFamily="34" charset="0"/>
+              <a:buChar char="•"/>
+              <a:defRPr sz="1800" kern="1200">
+                <a:solidFill>
+                  <a:schemeClr val="tx1"/>
+                </a:solidFill>
+                <a:latin typeface="+mn-lt"/>
+                <a:ea typeface="+mn-ea"/>
+                <a:cs typeface="+mn-cs"/>
+              </a:defRPr>
+            </a:lvl6pPr>
+            <a:lvl7pPr marL="2971800" indent="-228600" algn="l" defTabSz="914400" rtl="0" eaLnBrk="1" latinLnBrk="0" hangingPunct="1">
+              <a:lnSpc>
+                <a:spcPct val="90000"/>
+              </a:lnSpc>
+              <a:spcBef>
+                <a:spcPts val="500"/>
+              </a:spcBef>
+              <a:buFont typeface="Arial" panose="020B0604020202020204" pitchFamily="34" charset="0"/>
+              <a:buChar char="•"/>
+              <a:defRPr sz="1800" kern="1200">
+                <a:solidFill>
+                  <a:schemeClr val="tx1"/>
+                </a:solidFill>
+                <a:latin typeface="+mn-lt"/>
+                <a:ea typeface="+mn-ea"/>
+                <a:cs typeface="+mn-cs"/>
+              </a:defRPr>
+            </a:lvl7pPr>
+            <a:lvl8pPr marL="3429000" indent="-228600" algn="l" defTabSz="914400" rtl="0" eaLnBrk="1" latinLnBrk="0" hangingPunct="1">
+              <a:lnSpc>
+                <a:spcPct val="90000"/>
+              </a:lnSpc>
+              <a:spcBef>
+                <a:spcPts val="500"/>
+              </a:spcBef>
+              <a:buFont typeface="Arial" panose="020B0604020202020204" pitchFamily="34" charset="0"/>
+              <a:buChar char="•"/>
+              <a:defRPr sz="1800" kern="1200">
+                <a:solidFill>
+                  <a:schemeClr val="tx1"/>
+                </a:solidFill>
+                <a:latin typeface="+mn-lt"/>
+                <a:ea typeface="+mn-ea"/>
+                <a:cs typeface="+mn-cs"/>
+              </a:defRPr>
+            </a:lvl8pPr>
+            <a:lvl9pPr marL="3886200" indent="-228600" algn="l" defTabSz="914400" rtl="0" eaLnBrk="1" latinLnBrk="0" hangingPunct="1">
+              <a:lnSpc>
+                <a:spcPct val="90000"/>
+              </a:lnSpc>
+              <a:spcBef>
+                <a:spcPts val="500"/>
+              </a:spcBef>
+              <a:buFont typeface="Arial" panose="020B0604020202020204" pitchFamily="34" charset="0"/>
+              <a:buChar char="•"/>
+              <a:defRPr sz="1800" kern="1200">
+                <a:solidFill>
+                  <a:schemeClr val="tx1"/>
+                </a:solidFill>
+                <a:latin typeface="+mn-lt"/>
+                <a:ea typeface="+mn-ea"/>
+                <a:cs typeface="+mn-cs"/>
+              </a:defRPr>
+            </a:lvl9pPr>
+          </a:lstStyle>
+          <a:p>
+            <a:pPr marL="457200" lvl="1" indent="0" defTabSz="457200">
+              <a:lnSpc>
+                <a:spcPct val="150000"/>
+              </a:lnSpc>
+              <a:spcBef>
+                <a:spcPts val="600"/>
+              </a:spcBef>
+              <a:buNone/>
+              <a:defRPr sz="2800"/>
+            </a:pPr>
+            <a:r>
+              <a:rPr lang="en-US" sz="1800" dirty="0"/>
+              <a:t>Starting a dos box</a:t>
+            </a:r>
+          </a:p>
+          <a:p>
+            <a:pPr marL="800100" lvl="1" indent="-342900" defTabSz="457200">
+              <a:lnSpc>
+                <a:spcPct val="150000"/>
+              </a:lnSpc>
+              <a:spcBef>
+                <a:spcPts val="600"/>
+              </a:spcBef>
+              <a:buFont typeface="Arial"/>
+              <a:buChar char="•"/>
+              <a:defRPr sz="2800"/>
+            </a:pPr>
+            <a:r>
+              <a:rPr lang="en-US" sz="1800" dirty="0"/>
+              <a:t>Go to folder CWATM_exercise7</a:t>
+            </a:r>
+          </a:p>
+          <a:p>
+            <a:pPr marL="800100" lvl="1" indent="-342900" defTabSz="457200">
+              <a:lnSpc>
+                <a:spcPct val="150000"/>
+              </a:lnSpc>
+              <a:spcBef>
+                <a:spcPts val="600"/>
+              </a:spcBef>
+              <a:buFont typeface="Arial"/>
+              <a:buChar char="•"/>
+              <a:defRPr sz="2800"/>
+            </a:pPr>
+            <a:r>
+              <a:rPr lang="en-US" sz="1800" dirty="0"/>
+              <a:t>Start: 31_exe_example.bator open a DOS command prompt</a:t>
+            </a:r>
+          </a:p>
+          <a:p>
+            <a:pPr marL="457200" lvl="1" indent="0" defTabSz="457200">
+              <a:lnSpc>
+                <a:spcPct val="100000"/>
+              </a:lnSpc>
+              <a:spcBef>
+                <a:spcPts val="600"/>
+              </a:spcBef>
+              <a:buNone/>
+              <a:defRPr sz="2800"/>
+            </a:pPr>
+            <a:r>
+              <a:rPr lang="en-US" sz="1800" dirty="0"/>
+              <a:t>	</a:t>
+            </a:r>
+            <a:r>
+              <a:rPr lang="en-US" sz="1600" dirty="0"/>
+              <a:t>- press </a:t>
+            </a:r>
+            <a:r>
+              <a:rPr lang="en-US" sz="1600" dirty="0" err="1"/>
+              <a:t>Windows+R</a:t>
+            </a:r>
+            <a:r>
+              <a:rPr lang="en-US" sz="1600" dirty="0"/>
+              <a:t> </a:t>
+            </a:r>
+          </a:p>
+          <a:p>
+            <a:pPr marL="457200" lvl="1" indent="0" defTabSz="457200">
+              <a:lnSpc>
+                <a:spcPct val="100000"/>
+              </a:lnSpc>
+              <a:spcBef>
+                <a:spcPts val="600"/>
+              </a:spcBef>
+              <a:buNone/>
+              <a:defRPr sz="2800"/>
+            </a:pPr>
+            <a:r>
+              <a:rPr lang="en-US" sz="1600" dirty="0"/>
+              <a:t>	- type </a:t>
+            </a:r>
+            <a:r>
+              <a:rPr lang="en-US" sz="1600" dirty="0" err="1">
+                <a:solidFill>
+                  <a:srgbClr val="0070C0"/>
+                </a:solidFill>
+              </a:rPr>
+              <a:t>cmd</a:t>
+            </a:r>
+            <a:r>
+              <a:rPr lang="en-US" sz="1600" dirty="0">
+                <a:solidFill>
+                  <a:srgbClr val="0070C0"/>
+                </a:solidFill>
+              </a:rPr>
+              <a:t> </a:t>
+            </a:r>
+            <a:r>
+              <a:rPr lang="en-US" sz="1600" dirty="0"/>
+              <a:t>+ return</a:t>
+            </a:r>
+          </a:p>
+          <a:p>
+            <a:pPr marL="457200" lvl="1" indent="0" defTabSz="457200">
+              <a:lnSpc>
+                <a:spcPct val="100000"/>
+              </a:lnSpc>
+              <a:spcBef>
+                <a:spcPts val="600"/>
+              </a:spcBef>
+              <a:buNone/>
+              <a:defRPr sz="2800"/>
+            </a:pPr>
+            <a:r>
+              <a:rPr lang="en-US" sz="1600" dirty="0"/>
+              <a:t>	- change directory: e.g. cd c:/CWATM/CWATM_exercise7</a:t>
+            </a:r>
+            <a:br>
+              <a:rPr lang="en-US" sz="1600" dirty="0"/>
+            </a:br>
+            <a:r>
+              <a:rPr lang="en-US" sz="1600" dirty="0"/>
+              <a:t>		(or cd “c:/directory with white space/CWATM/CWATM_exercise7”)</a:t>
+            </a:r>
+          </a:p>
+          <a:p>
+            <a:pPr marL="457200" lvl="1" indent="0" defTabSz="457200">
+              <a:lnSpc>
+                <a:spcPct val="100000"/>
+              </a:lnSpc>
+              <a:spcBef>
+                <a:spcPts val="600"/>
+              </a:spcBef>
+              <a:buNone/>
+              <a:defRPr sz="2800"/>
+            </a:pPr>
+            <a:endParaRPr lang="en-US" sz="1600" dirty="0"/>
+          </a:p>
+          <a:p>
+            <a:pPr lvl="1" defTabSz="457200">
+              <a:lnSpc>
+                <a:spcPct val="100000"/>
+              </a:lnSpc>
+              <a:spcBef>
+                <a:spcPts val="600"/>
+              </a:spcBef>
+              <a:defRPr sz="2800"/>
+            </a:pPr>
+            <a:r>
+              <a:rPr lang="en-US" sz="1600" dirty="0"/>
+              <a:t>Type </a:t>
+            </a:r>
+          </a:p>
+          <a:p>
+            <a:pPr marL="457200" lvl="1" indent="0" defTabSz="457200">
+              <a:lnSpc>
+                <a:spcPct val="100000"/>
+              </a:lnSpc>
+              <a:spcBef>
+                <a:spcPts val="600"/>
+              </a:spcBef>
+              <a:buNone/>
+              <a:defRPr sz="2800"/>
+            </a:pPr>
+            <a:r>
+              <a:rPr lang="en-US" sz="1600" dirty="0">
+                <a:solidFill>
+                  <a:srgbClr val="0070C0"/>
+                </a:solidFill>
+              </a:rPr>
+              <a:t>..\</a:t>
+            </a:r>
+            <a:r>
+              <a:rPr lang="en-US" sz="1600" dirty="0" err="1">
+                <a:solidFill>
+                  <a:srgbClr val="0070C0"/>
+                </a:solidFill>
+              </a:rPr>
+              <a:t>CWATM_model</a:t>
+            </a:r>
+            <a:r>
+              <a:rPr lang="en-US" sz="1600" dirty="0">
+                <a:solidFill>
+                  <a:srgbClr val="0070C0"/>
+                </a:solidFill>
+              </a:rPr>
+              <a:t>\</a:t>
+            </a:r>
+            <a:r>
+              <a:rPr lang="en-US" sz="1600" dirty="0" err="1">
+                <a:solidFill>
+                  <a:srgbClr val="0070C0"/>
+                </a:solidFill>
+              </a:rPr>
+              <a:t>CWatMexe</a:t>
+            </a:r>
+            <a:r>
+              <a:rPr lang="en-US" sz="1600" dirty="0">
+                <a:solidFill>
+                  <a:srgbClr val="0070C0"/>
+                </a:solidFill>
+              </a:rPr>
+              <a:t>\cwatm.exe settings_rhine30min_71.ini -l</a:t>
+            </a:r>
+          </a:p>
+          <a:p>
+            <a:pPr marL="457200" lvl="1" indent="0" defTabSz="457200">
+              <a:lnSpc>
+                <a:spcPct val="100000"/>
+              </a:lnSpc>
+              <a:spcBef>
+                <a:spcPts val="600"/>
+              </a:spcBef>
+              <a:buNone/>
+              <a:defRPr sz="2800"/>
+            </a:pPr>
+            <a:endParaRPr lang="en-US" sz="1600" dirty="0"/>
+          </a:p>
+          <a:p>
+            <a:pPr marL="800100" lvl="1" indent="-342900" defTabSz="457200">
+              <a:lnSpc>
+                <a:spcPct val="150000"/>
+              </a:lnSpc>
+              <a:spcBef>
+                <a:spcPts val="600"/>
+              </a:spcBef>
+              <a:buFont typeface="Arial"/>
+              <a:buChar char="•"/>
+              <a:defRPr sz="2800"/>
+            </a:pPr>
+            <a:endParaRPr lang="en-US" sz="1800" dirty="0"/>
+          </a:p>
+          <a:p>
+            <a:pPr marL="800100" lvl="1" indent="-342900" defTabSz="457200">
+              <a:lnSpc>
+                <a:spcPct val="150000"/>
+              </a:lnSpc>
+              <a:spcBef>
+                <a:spcPts val="600"/>
+              </a:spcBef>
+              <a:buFont typeface="Arial"/>
+              <a:buChar char="•"/>
+              <a:defRPr sz="2800"/>
+            </a:pPr>
+            <a:endParaRPr lang="en-US" dirty="0"/>
+          </a:p>
+          <a:p>
+            <a:pPr marL="342900" indent="-342900" defTabSz="457200">
+              <a:lnSpc>
+                <a:spcPct val="150000"/>
+              </a:lnSpc>
+              <a:spcBef>
+                <a:spcPts val="600"/>
+              </a:spcBef>
+              <a:buFont typeface="Arial"/>
+              <a:buChar char="•"/>
+              <a:defRPr sz="2800"/>
+            </a:pPr>
+            <a:endParaRPr lang="en-US" dirty="0"/>
+          </a:p>
+        </p:txBody>
+      </p:sp>
+      <p:pic>
+        <p:nvPicPr>
+          <p:cNvPr id="5" name="Picture 4">
+            <a:extLst>
+              <a:ext uri="{FF2B5EF4-FFF2-40B4-BE49-F238E27FC236}">
+                <a16:creationId xmlns:a16="http://schemas.microsoft.com/office/drawing/2014/main" id="{247ED940-AFBE-4D9D-A991-45A5CD197A54}"/>
+              </a:ext>
+            </a:extLst>
+          </p:cNvPr>
+          <p:cNvPicPr>
+            <a:picLocks noChangeAspect="1"/>
+          </p:cNvPicPr>
+          <p:nvPr/>
+        </p:nvPicPr>
+        <p:blipFill>
+          <a:blip r:embed="rId3"/>
+          <a:stretch>
+            <a:fillRect/>
+          </a:stretch>
+        </p:blipFill>
+        <p:spPr>
+          <a:xfrm>
+            <a:off x="8167687" y="2921454"/>
+            <a:ext cx="2984687" cy="1555296"/>
+          </a:xfrm>
+          <a:prstGeom prst="rect">
+            <a:avLst/>
+          </a:prstGeom>
+        </p:spPr>
+      </p:pic>
+    </p:spTree>
+    <p:extLst>
+      <p:ext uri="{BB962C8B-B14F-4D97-AF65-F5344CB8AC3E}">
+        <p14:creationId xmlns:p14="http://schemas.microsoft.com/office/powerpoint/2010/main" val="286045206"/>
+      </p:ext>
+    </p:extLst>
+  </p:cSld>
+  <p:clrMapOvr>
+    <a:masterClrMapping/>
+  </p:clrMapOvr>
+</p:sld>
+</file>
+
+<file path=ppt/slides/slide18.xml><?xml version="1.0" encoding="utf-8"?>
+<p:sld xmlns:a="http://schemas.openxmlformats.org/drawingml/2006/main" xmlns:r="http://schemas.openxmlformats.org/officeDocument/2006/relationships" xmlns:p="http://schemas.openxmlformats.org/presentationml/2006/main">
+  <p:cSld>
+    <p:spTree>
+      <p:nvGrpSpPr>
+        <p:cNvPr id="1" name=""/>
+        <p:cNvGrpSpPr/>
+        <p:nvPr/>
+      </p:nvGrpSpPr>
+      <p:grpSpPr>
+        <a:xfrm>
+          <a:off x="0" y="0"/>
+          <a:ext cx="0" cy="0"/>
+          <a:chOff x="0" y="0"/>
+          <a:chExt cx="0" cy="0"/>
+        </a:xfrm>
+      </p:grpSpPr>
+      <p:sp>
+        <p:nvSpPr>
+          <p:cNvPr id="3" name="Determine the impact of different policies on the future behavior of some real system…">
+            <a:extLst>
+              <a:ext uri="{FF2B5EF4-FFF2-40B4-BE49-F238E27FC236}">
+                <a16:creationId xmlns:a16="http://schemas.microsoft.com/office/drawing/2014/main" id="{33677E76-ECF5-4F7D-B13A-F372C3169ACE}"/>
+              </a:ext>
+            </a:extLst>
+          </p:cNvPr>
+          <p:cNvSpPr txBox="1">
+            <a:spLocks/>
+          </p:cNvSpPr>
+          <p:nvPr/>
+        </p:nvSpPr>
+        <p:spPr>
+          <a:xfrm>
+            <a:off x="278131" y="531337"/>
+            <a:ext cx="11847193" cy="5509575"/>
+          </a:xfrm>
+          <a:prstGeom prst="rect">
+            <a:avLst/>
+          </a:prstGeom>
+        </p:spPr>
+        <p:txBody>
+          <a:bodyPr vert="horz" lIns="91440" tIns="45720" rIns="91440" bIns="45720" rtlCol="0">
+            <a:normAutofit lnSpcReduction="10000"/>
+          </a:bodyPr>
+          <a:lstStyle>
+            <a:lvl1pPr marL="228600" indent="-228600" algn="l" defTabSz="914400" rtl="0" eaLnBrk="1" latinLnBrk="0" hangingPunct="1">
+              <a:lnSpc>
+                <a:spcPct val="90000"/>
+              </a:lnSpc>
+              <a:spcBef>
+                <a:spcPts val="1000"/>
+              </a:spcBef>
+              <a:buFont typeface="Arial" panose="020B0604020202020204" pitchFamily="34" charset="0"/>
+              <a:buChar char="•"/>
+              <a:defRPr sz="2800" kern="1200">
+                <a:solidFill>
+                  <a:schemeClr val="tx1"/>
+                </a:solidFill>
+                <a:latin typeface="Tahoma" panose="020B0604030504040204" pitchFamily="34" charset="0"/>
+                <a:ea typeface="Tahoma" panose="020B0604030504040204" pitchFamily="34" charset="0"/>
+                <a:cs typeface="Tahoma" panose="020B0604030504040204" pitchFamily="34" charset="0"/>
+              </a:defRPr>
+            </a:lvl1pPr>
+            <a:lvl2pPr marL="685800" indent="-228600" algn="l" defTabSz="914400" rtl="0" eaLnBrk="1" latinLnBrk="0" hangingPunct="1">
+              <a:lnSpc>
+                <a:spcPct val="90000"/>
+              </a:lnSpc>
+              <a:spcBef>
+                <a:spcPts val="500"/>
+              </a:spcBef>
+              <a:buFont typeface="Arial" panose="020B0604020202020204" pitchFamily="34" charset="0"/>
+              <a:buChar char="•"/>
+              <a:defRPr sz="2400" b="0" kern="1200">
+                <a:solidFill>
+                  <a:schemeClr val="tx1"/>
+                </a:solidFill>
+                <a:latin typeface="Tahoma" panose="020B0604030504040204" pitchFamily="34" charset="0"/>
+                <a:ea typeface="Tahoma" panose="020B0604030504040204" pitchFamily="34" charset="0"/>
+                <a:cs typeface="Tahoma" panose="020B0604030504040204" pitchFamily="34" charset="0"/>
+              </a:defRPr>
+            </a:lvl2pPr>
+            <a:lvl3pPr marL="1143000" indent="-228600" algn="l" defTabSz="914400" rtl="0" eaLnBrk="1" latinLnBrk="0" hangingPunct="1">
+              <a:lnSpc>
+                <a:spcPct val="90000"/>
+              </a:lnSpc>
+              <a:spcBef>
+                <a:spcPts val="500"/>
+              </a:spcBef>
+              <a:buFont typeface="Arial" panose="020B0604020202020204" pitchFamily="34" charset="0"/>
+              <a:buChar char="•"/>
+              <a:defRPr sz="2000" kern="1200">
+                <a:solidFill>
+                  <a:schemeClr val="tx1"/>
+                </a:solidFill>
+                <a:latin typeface="Tahoma" panose="020B0604030504040204" pitchFamily="34" charset="0"/>
+                <a:ea typeface="Tahoma" panose="020B0604030504040204" pitchFamily="34" charset="0"/>
+                <a:cs typeface="Tahoma" panose="020B0604030504040204" pitchFamily="34" charset="0"/>
+              </a:defRPr>
+            </a:lvl3pPr>
+            <a:lvl4pPr marL="1600200" indent="-228600" algn="l" defTabSz="914400" rtl="0" eaLnBrk="1" latinLnBrk="0" hangingPunct="1">
+              <a:lnSpc>
+                <a:spcPct val="90000"/>
+              </a:lnSpc>
+              <a:spcBef>
+                <a:spcPts val="500"/>
+              </a:spcBef>
+              <a:buFont typeface="Arial" panose="020B0604020202020204" pitchFamily="34" charset="0"/>
+              <a:buChar char="•"/>
+              <a:defRPr sz="1800" kern="1200">
+                <a:solidFill>
+                  <a:schemeClr val="tx1"/>
+                </a:solidFill>
+                <a:latin typeface="Tahoma" panose="020B0604030504040204" pitchFamily="34" charset="0"/>
+                <a:ea typeface="Tahoma" panose="020B0604030504040204" pitchFamily="34" charset="0"/>
+                <a:cs typeface="Tahoma" panose="020B0604030504040204" pitchFamily="34" charset="0"/>
+              </a:defRPr>
+            </a:lvl4pPr>
+            <a:lvl5pPr marL="2057400" indent="-228600" algn="l" defTabSz="914400" rtl="0" eaLnBrk="1" latinLnBrk="0" hangingPunct="1">
+              <a:lnSpc>
+                <a:spcPct val="90000"/>
+              </a:lnSpc>
+              <a:spcBef>
+                <a:spcPts val="500"/>
+              </a:spcBef>
+              <a:buFont typeface="Arial" panose="020B0604020202020204" pitchFamily="34" charset="0"/>
+              <a:buChar char="•"/>
+              <a:defRPr sz="1800" kern="1200">
+                <a:solidFill>
+                  <a:schemeClr val="tx1"/>
+                </a:solidFill>
+                <a:latin typeface="Tahoma" panose="020B0604030504040204" pitchFamily="34" charset="0"/>
+                <a:ea typeface="Tahoma" panose="020B0604030504040204" pitchFamily="34" charset="0"/>
+                <a:cs typeface="Tahoma" panose="020B0604030504040204" pitchFamily="34" charset="0"/>
+              </a:defRPr>
+            </a:lvl5pPr>
+            <a:lvl6pPr marL="2514600" indent="-228600" algn="l" defTabSz="914400" rtl="0" eaLnBrk="1" latinLnBrk="0" hangingPunct="1">
+              <a:lnSpc>
+                <a:spcPct val="90000"/>
+              </a:lnSpc>
+              <a:spcBef>
+                <a:spcPts val="500"/>
+              </a:spcBef>
+              <a:buFont typeface="Arial" panose="020B0604020202020204" pitchFamily="34" charset="0"/>
+              <a:buChar char="•"/>
+              <a:defRPr sz="1800" kern="1200">
+                <a:solidFill>
+                  <a:schemeClr val="tx1"/>
+                </a:solidFill>
+                <a:latin typeface="+mn-lt"/>
+                <a:ea typeface="+mn-ea"/>
+                <a:cs typeface="+mn-cs"/>
+              </a:defRPr>
+            </a:lvl6pPr>
+            <a:lvl7pPr marL="2971800" indent="-228600" algn="l" defTabSz="914400" rtl="0" eaLnBrk="1" latinLnBrk="0" hangingPunct="1">
+              <a:lnSpc>
+                <a:spcPct val="90000"/>
+              </a:lnSpc>
+              <a:spcBef>
+                <a:spcPts val="500"/>
+              </a:spcBef>
+              <a:buFont typeface="Arial" panose="020B0604020202020204" pitchFamily="34" charset="0"/>
+              <a:buChar char="•"/>
+              <a:defRPr sz="1800" kern="1200">
+                <a:solidFill>
+                  <a:schemeClr val="tx1"/>
+                </a:solidFill>
+                <a:latin typeface="+mn-lt"/>
+                <a:ea typeface="+mn-ea"/>
+                <a:cs typeface="+mn-cs"/>
+              </a:defRPr>
+            </a:lvl7pPr>
+            <a:lvl8pPr marL="3429000" indent="-228600" algn="l" defTabSz="914400" rtl="0" eaLnBrk="1" latinLnBrk="0" hangingPunct="1">
+              <a:lnSpc>
+                <a:spcPct val="90000"/>
+              </a:lnSpc>
+              <a:spcBef>
+                <a:spcPts val="500"/>
+              </a:spcBef>
+              <a:buFont typeface="Arial" panose="020B0604020202020204" pitchFamily="34" charset="0"/>
+              <a:buChar char="•"/>
+              <a:defRPr sz="1800" kern="1200">
+                <a:solidFill>
+                  <a:schemeClr val="tx1"/>
+                </a:solidFill>
+                <a:latin typeface="+mn-lt"/>
+                <a:ea typeface="+mn-ea"/>
+                <a:cs typeface="+mn-cs"/>
+              </a:defRPr>
+            </a:lvl8pPr>
+            <a:lvl9pPr marL="3886200" indent="-228600" algn="l" defTabSz="914400" rtl="0" eaLnBrk="1" latinLnBrk="0" hangingPunct="1">
+              <a:lnSpc>
+                <a:spcPct val="90000"/>
+              </a:lnSpc>
+              <a:spcBef>
+                <a:spcPts val="500"/>
+              </a:spcBef>
+              <a:buFont typeface="Arial" panose="020B0604020202020204" pitchFamily="34" charset="0"/>
+              <a:buChar char="•"/>
+              <a:defRPr sz="1800" kern="1200">
+                <a:solidFill>
+                  <a:schemeClr val="tx1"/>
+                </a:solidFill>
+                <a:latin typeface="+mn-lt"/>
+                <a:ea typeface="+mn-ea"/>
+                <a:cs typeface="+mn-cs"/>
+              </a:defRPr>
+            </a:lvl9pPr>
+          </a:lstStyle>
+          <a:p>
+            <a:pPr marL="0" indent="0" defTabSz="457200">
+              <a:lnSpc>
+                <a:spcPct val="150000"/>
+              </a:lnSpc>
+              <a:spcBef>
+                <a:spcPts val="600"/>
+              </a:spcBef>
+              <a:buNone/>
+              <a:defRPr sz="2800"/>
+            </a:pPr>
+            <a:r>
+              <a:rPr lang="en-US" dirty="0"/>
+              <a:t>Problems</a:t>
+            </a:r>
+          </a:p>
+          <a:p>
+            <a:pPr marL="0" indent="0" defTabSz="457200">
+              <a:lnSpc>
+                <a:spcPts val="2000"/>
+              </a:lnSpc>
+              <a:spcBef>
+                <a:spcPts val="600"/>
+              </a:spcBef>
+              <a:buNone/>
+              <a:defRPr sz="2800"/>
+            </a:pPr>
+            <a:r>
+              <a:rPr lang="en-US" sz="1800" dirty="0"/>
+              <a:t>Most problems come from different file systems, folder structures</a:t>
+            </a:r>
+          </a:p>
+          <a:p>
+            <a:pPr marL="0" indent="0" defTabSz="457200">
+              <a:lnSpc>
+                <a:spcPts val="2000"/>
+              </a:lnSpc>
+              <a:spcBef>
+                <a:spcPts val="600"/>
+              </a:spcBef>
+              <a:buNone/>
+              <a:defRPr sz="2800"/>
+            </a:pPr>
+            <a:r>
+              <a:rPr lang="en-US" sz="1800" dirty="0"/>
+              <a:t>We try to set up everything with relative path.</a:t>
+            </a:r>
+          </a:p>
+          <a:p>
+            <a:pPr marL="457200" indent="-457200" defTabSz="457200">
+              <a:lnSpc>
+                <a:spcPts val="2000"/>
+              </a:lnSpc>
+              <a:spcBef>
+                <a:spcPts val="600"/>
+              </a:spcBef>
+              <a:buAutoNum type="arabicPeriod"/>
+              <a:defRPr sz="2800"/>
+            </a:pPr>
+            <a:r>
+              <a:rPr lang="en-US" sz="1800" dirty="0"/>
+              <a:t>Please make sure that your folders have a similar structure like in slide 3 in cwatm_exercise1.ppt</a:t>
+            </a:r>
+          </a:p>
+          <a:p>
+            <a:pPr marL="457200" indent="-457200" defTabSz="457200">
+              <a:lnSpc>
+                <a:spcPts val="2000"/>
+              </a:lnSpc>
+              <a:spcBef>
+                <a:spcPts val="600"/>
+              </a:spcBef>
+              <a:buAutoNum type="arabicPeriod"/>
+              <a:defRPr sz="2800"/>
+            </a:pPr>
+            <a:r>
+              <a:rPr lang="en-US" sz="1800" dirty="0"/>
+              <a:t>The settings file has a part:</a:t>
+            </a:r>
+          </a:p>
+          <a:p>
+            <a:pPr marL="0" indent="0" defTabSz="457200">
+              <a:lnSpc>
+                <a:spcPct val="100000"/>
+              </a:lnSpc>
+              <a:spcBef>
+                <a:spcPts val="0"/>
+              </a:spcBef>
+              <a:buNone/>
+              <a:defRPr sz="2800"/>
+            </a:pPr>
+            <a:r>
+              <a:rPr lang="en-US" sz="1200" dirty="0"/>
+              <a:t>[FILE_PATHS]</a:t>
+            </a:r>
+          </a:p>
+          <a:p>
+            <a:pPr marL="0" indent="0" defTabSz="457200">
+              <a:lnSpc>
+                <a:spcPct val="100000"/>
+              </a:lnSpc>
+              <a:spcBef>
+                <a:spcPts val="0"/>
+              </a:spcBef>
+              <a:buNone/>
+              <a:defRPr sz="2800"/>
+            </a:pPr>
+            <a:r>
+              <a:rPr lang="en-US" sz="1200" dirty="0" err="1"/>
+              <a:t>PathRoot</a:t>
+            </a:r>
+            <a:r>
+              <a:rPr lang="en-US" sz="1200" dirty="0"/>
+              <a:t> = ../</a:t>
+            </a:r>
+            <a:r>
+              <a:rPr lang="en-US" sz="1200" dirty="0" err="1"/>
+              <a:t>cwatm_data</a:t>
+            </a:r>
+            <a:r>
+              <a:rPr lang="en-US" sz="1200" dirty="0"/>
+              <a:t>						../    	jumps back to the previous folder </a:t>
+            </a:r>
+          </a:p>
+          <a:p>
+            <a:pPr marL="0" indent="0" defTabSz="457200">
+              <a:lnSpc>
+                <a:spcPct val="100000"/>
+              </a:lnSpc>
+              <a:spcBef>
+                <a:spcPts val="0"/>
+              </a:spcBef>
+              <a:buNone/>
+              <a:defRPr sz="2800"/>
+            </a:pPr>
+            <a:r>
+              <a:rPr lang="en-US" sz="1200" dirty="0" err="1"/>
+              <a:t>PathOut</a:t>
+            </a:r>
+            <a:r>
+              <a:rPr lang="en-US" sz="1200" dirty="0"/>
+              <a:t> = ./output							./ 	uses the folder output in the same folder as the settings file or the directory you are in</a:t>
+            </a:r>
+          </a:p>
+          <a:p>
+            <a:pPr marL="0" indent="0" defTabSz="457200">
+              <a:lnSpc>
+                <a:spcPct val="100000"/>
+              </a:lnSpc>
+              <a:spcBef>
+                <a:spcPts val="0"/>
+              </a:spcBef>
+              <a:buNone/>
+              <a:defRPr sz="2800"/>
+            </a:pPr>
+            <a:r>
+              <a:rPr lang="en-US" sz="1200" dirty="0" err="1"/>
+              <a:t>PathMaps</a:t>
+            </a:r>
+            <a:r>
+              <a:rPr lang="en-US" sz="1200" dirty="0"/>
+              <a:t> = $(</a:t>
+            </a:r>
+            <a:r>
+              <a:rPr lang="en-US" sz="1200" dirty="0" err="1"/>
+              <a:t>PathRoot</a:t>
+            </a:r>
+            <a:r>
+              <a:rPr lang="en-US" sz="1200" dirty="0"/>
+              <a:t>)/cwatm_input30min</a:t>
+            </a:r>
+          </a:p>
+          <a:p>
+            <a:pPr marL="0" indent="0" defTabSz="457200">
+              <a:lnSpc>
+                <a:spcPct val="100000"/>
+              </a:lnSpc>
+              <a:spcBef>
+                <a:spcPts val="0"/>
+              </a:spcBef>
+              <a:buNone/>
+              <a:defRPr sz="2800"/>
+            </a:pPr>
+            <a:r>
+              <a:rPr lang="en-US" sz="1200" dirty="0" err="1"/>
+              <a:t>PathMeteo</a:t>
+            </a:r>
+            <a:r>
+              <a:rPr lang="en-US" sz="1200" dirty="0"/>
+              <a:t> = $(</a:t>
+            </a:r>
+            <a:r>
+              <a:rPr lang="en-US" sz="1200" dirty="0" err="1"/>
+              <a:t>PathRoot</a:t>
+            </a:r>
+            <a:r>
+              <a:rPr lang="en-US" sz="1200" dirty="0"/>
+              <a:t>)/climate/</a:t>
+            </a:r>
+            <a:r>
+              <a:rPr lang="en-US" sz="1200" dirty="0" err="1"/>
+              <a:t>rhine</a:t>
+            </a:r>
+            <a:endParaRPr lang="en-US" sz="1200" dirty="0"/>
+          </a:p>
+          <a:p>
+            <a:pPr marL="0" indent="0" defTabSz="457200">
+              <a:lnSpc>
+                <a:spcPct val="100000"/>
+              </a:lnSpc>
+              <a:spcBef>
+                <a:spcPts val="0"/>
+              </a:spcBef>
+              <a:buNone/>
+              <a:defRPr sz="2800"/>
+            </a:pPr>
+            <a:endParaRPr lang="en-US" sz="1100" dirty="0"/>
+          </a:p>
+          <a:p>
+            <a:pPr marL="0" indent="0" defTabSz="457200">
+              <a:lnSpc>
+                <a:spcPct val="100000"/>
+              </a:lnSpc>
+              <a:spcBef>
+                <a:spcPts val="0"/>
+              </a:spcBef>
+              <a:buNone/>
+              <a:defRPr sz="2800"/>
+            </a:pPr>
+            <a:r>
+              <a:rPr lang="en-US" sz="1800" dirty="0"/>
+              <a:t>3. If this is not working you can use also absolute path (also with white space)</a:t>
+            </a:r>
+          </a:p>
+          <a:p>
+            <a:pPr marL="0" indent="0" defTabSz="457200">
+              <a:lnSpc>
+                <a:spcPct val="100000"/>
+              </a:lnSpc>
+              <a:spcBef>
+                <a:spcPts val="0"/>
+              </a:spcBef>
+              <a:buNone/>
+              <a:defRPr sz="2800"/>
+            </a:pPr>
+            <a:r>
+              <a:rPr lang="en-US" sz="1200" dirty="0" err="1"/>
+              <a:t>PathRoot</a:t>
+            </a:r>
+            <a:r>
+              <a:rPr lang="en-US" sz="1200" dirty="0"/>
+              <a:t> = C/root directory/</a:t>
+            </a:r>
+            <a:r>
+              <a:rPr lang="en-US" sz="1200" dirty="0" err="1"/>
+              <a:t>second.root</a:t>
+            </a:r>
+            <a:r>
+              <a:rPr lang="en-US" sz="1200" dirty="0"/>
+              <a:t>/</a:t>
+            </a:r>
+            <a:r>
+              <a:rPr lang="en-US" sz="1200" dirty="0" err="1"/>
+              <a:t>cwatm</a:t>
+            </a:r>
+            <a:r>
+              <a:rPr lang="en-US" sz="1200" dirty="0"/>
+              <a:t>/</a:t>
+            </a:r>
+            <a:r>
+              <a:rPr lang="en-US" sz="1200" dirty="0" err="1"/>
+              <a:t>cwatm_data</a:t>
+            </a:r>
+            <a:endParaRPr lang="en-US" sz="1200" dirty="0"/>
+          </a:p>
+          <a:p>
+            <a:pPr marL="0" indent="0" defTabSz="457200">
+              <a:lnSpc>
+                <a:spcPct val="100000"/>
+              </a:lnSpc>
+              <a:spcBef>
+                <a:spcPts val="0"/>
+              </a:spcBef>
+              <a:buNone/>
+              <a:defRPr sz="2800"/>
+            </a:pPr>
+            <a:endParaRPr lang="en-US" sz="1200" dirty="0"/>
+          </a:p>
+          <a:p>
+            <a:pPr marL="0" indent="0" defTabSz="457200">
+              <a:lnSpc>
+                <a:spcPct val="100000"/>
+              </a:lnSpc>
+              <a:spcBef>
+                <a:spcPts val="0"/>
+              </a:spcBef>
+              <a:buNone/>
+              <a:defRPr sz="2800"/>
+            </a:pPr>
+            <a:r>
+              <a:rPr lang="en-US" sz="1800" dirty="0"/>
+              <a:t>4. If you execute </a:t>
+            </a:r>
+            <a:r>
+              <a:rPr lang="en-US" sz="1800" dirty="0" err="1"/>
+              <a:t>cwatm</a:t>
+            </a:r>
+            <a:r>
+              <a:rPr lang="en-US" sz="1800" dirty="0"/>
+              <a:t> you can also use absolute path</a:t>
+            </a:r>
+          </a:p>
+          <a:p>
+            <a:pPr marL="0" indent="0" defTabSz="457200">
+              <a:lnSpc>
+                <a:spcPct val="100000"/>
+              </a:lnSpc>
+              <a:spcBef>
+                <a:spcPts val="0"/>
+              </a:spcBef>
+              <a:buNone/>
+              <a:defRPr sz="2800"/>
+            </a:pPr>
+            <a:r>
+              <a:rPr lang="en-US" sz="1200" dirty="0"/>
+              <a:t>instead</a:t>
+            </a:r>
+          </a:p>
+          <a:p>
+            <a:pPr marL="0" indent="0" defTabSz="457200">
+              <a:lnSpc>
+                <a:spcPct val="100000"/>
+              </a:lnSpc>
+              <a:spcBef>
+                <a:spcPts val="0"/>
+              </a:spcBef>
+              <a:buNone/>
+              <a:defRPr sz="2800"/>
+            </a:pPr>
+            <a:r>
+              <a:rPr lang="en-US" sz="1200" dirty="0"/>
+              <a:t>../</a:t>
+            </a:r>
+            <a:r>
+              <a:rPr lang="en-US" sz="1200" dirty="0" err="1"/>
+              <a:t>CWATM_model</a:t>
+            </a:r>
+            <a:r>
+              <a:rPr lang="en-US" sz="1200" dirty="0"/>
+              <a:t>/</a:t>
+            </a:r>
+            <a:r>
+              <a:rPr lang="en-US" sz="1200" dirty="0" err="1"/>
+              <a:t>CWatMexe</a:t>
+            </a:r>
+            <a:r>
+              <a:rPr lang="en-US" sz="1200" dirty="0"/>
+              <a:t>/cwatm.exe settings_rhine30min.ini –l</a:t>
+            </a:r>
+          </a:p>
+          <a:p>
+            <a:pPr marL="0" indent="0" defTabSz="457200">
+              <a:lnSpc>
+                <a:spcPct val="100000"/>
+              </a:lnSpc>
+              <a:spcBef>
+                <a:spcPts val="0"/>
+              </a:spcBef>
+              <a:buNone/>
+              <a:defRPr sz="2800"/>
+            </a:pPr>
+            <a:r>
+              <a:rPr lang="en-US" sz="1200" dirty="0"/>
+              <a:t>“C/root directory/</a:t>
+            </a:r>
+            <a:r>
+              <a:rPr lang="en-US" sz="1200" dirty="0" err="1"/>
+              <a:t>second.root</a:t>
+            </a:r>
+            <a:r>
+              <a:rPr lang="en-US" sz="1200" dirty="0"/>
+              <a:t>/</a:t>
+            </a:r>
+            <a:r>
+              <a:rPr lang="en-US" sz="1200" dirty="0" err="1"/>
+              <a:t>cwatm</a:t>
+            </a:r>
+            <a:r>
+              <a:rPr lang="en-US" sz="1200" dirty="0"/>
+              <a:t>/</a:t>
+            </a:r>
+            <a:r>
+              <a:rPr lang="en-US" sz="1200" dirty="0" err="1"/>
+              <a:t>CWATM_model</a:t>
+            </a:r>
+            <a:r>
+              <a:rPr lang="en-US" sz="1200" dirty="0"/>
+              <a:t>/</a:t>
+            </a:r>
+            <a:r>
+              <a:rPr lang="en-US" sz="1200" dirty="0" err="1"/>
+              <a:t>CWatMexe</a:t>
+            </a:r>
+            <a:r>
+              <a:rPr lang="en-US" sz="1200" dirty="0"/>
+              <a:t>/cwatm.exe” settings_rhine30min.ini –l  </a:t>
+            </a:r>
+            <a:r>
+              <a:rPr lang="en-US" sz="1200" dirty="0">
+                <a:solidFill>
+                  <a:srgbClr val="FF0000"/>
+                </a:solidFill>
+              </a:rPr>
+              <a:t> (mind the “ if there are white spaces)</a:t>
+            </a:r>
+          </a:p>
+          <a:p>
+            <a:pPr marL="0" indent="0" defTabSz="457200">
+              <a:lnSpc>
+                <a:spcPct val="100000"/>
+              </a:lnSpc>
+              <a:spcBef>
+                <a:spcPts val="0"/>
+              </a:spcBef>
+              <a:buNone/>
+              <a:defRPr sz="2800"/>
+            </a:pPr>
+            <a:endParaRPr lang="en-US" sz="1200" dirty="0"/>
+          </a:p>
+          <a:p>
+            <a:pPr marL="0" indent="0" defTabSz="457200">
+              <a:lnSpc>
+                <a:spcPct val="100000"/>
+              </a:lnSpc>
+              <a:spcBef>
+                <a:spcPts val="0"/>
+              </a:spcBef>
+              <a:buNone/>
+              <a:defRPr sz="2800"/>
+            </a:pPr>
+            <a:endParaRPr lang="en-US" sz="1200" dirty="0"/>
+          </a:p>
+          <a:p>
+            <a:pPr marL="0" indent="0" defTabSz="457200">
+              <a:lnSpc>
+                <a:spcPct val="100000"/>
+              </a:lnSpc>
+              <a:spcBef>
+                <a:spcPts val="0"/>
+              </a:spcBef>
+              <a:buNone/>
+              <a:defRPr sz="2800"/>
+            </a:pPr>
+            <a:r>
+              <a:rPr lang="en-US" sz="1800" dirty="0"/>
+              <a:t>5. Some other errors we address in:</a:t>
+            </a:r>
+          </a:p>
+          <a:p>
+            <a:pPr marL="0" indent="0" defTabSz="457200">
+              <a:lnSpc>
+                <a:spcPct val="100000"/>
+              </a:lnSpc>
+              <a:spcBef>
+                <a:spcPts val="0"/>
+              </a:spcBef>
+              <a:buNone/>
+              <a:defRPr sz="2800"/>
+            </a:pPr>
+            <a:r>
+              <a:rPr lang="en-US" sz="1800" dirty="0">
+                <a:solidFill>
+                  <a:srgbClr val="0070C0"/>
+                </a:solidFill>
+                <a:hlinkClick r:id="rId3">
+                  <a:extLst>
+                    <a:ext uri="{A12FA001-AC4F-418D-AE19-62706E023703}">
+                      <ahyp:hlinkClr xmlns:ahyp="http://schemas.microsoft.com/office/drawing/2018/hyperlinkcolor" val="tx"/>
+                    </a:ext>
+                  </a:extLst>
+                </a:hlinkClick>
+              </a:rPr>
+              <a:t>https://cwatm.iiasa.ac.at/tutorial.html#test-the-python-model-version</a:t>
+            </a:r>
+            <a:endParaRPr lang="en-US" sz="1800" dirty="0"/>
+          </a:p>
+        </p:txBody>
+      </p:sp>
+    </p:spTree>
+    <p:extLst>
+      <p:ext uri="{BB962C8B-B14F-4D97-AF65-F5344CB8AC3E}">
+        <p14:creationId xmlns:p14="http://schemas.microsoft.com/office/powerpoint/2010/main" val="1374173588"/>
       </p:ext>
     </p:extLst>
   </p:cSld>
@@ -17533,12 +19775,13 @@
             </a:pPr>
             <a:r>
               <a:rPr lang="en-US" sz="1400" b="1" dirty="0"/>
-              <a:t>There are two possibilities:</a:t>
-            </a:r>
-          </a:p>
-          <a:p>
-            <a:pPr marL="0" indent="0">
-              <a:buNone/>
+              <a:t>There are three possibilities:</a:t>
+            </a:r>
+          </a:p>
+          <a:p>
+            <a:pPr marL="342900" indent="-342900">
+              <a:buFont typeface="+mj-lt"/>
+              <a:buAutoNum type="arabicPeriod"/>
             </a:pPr>
             <a:r>
               <a:rPr lang="en-US" sz="1400" dirty="0"/>
@@ -17554,8 +19797,9 @@
             </a:r>
           </a:p>
           <a:p>
-            <a:pPr marL="0" indent="0">
-              <a:buNone/>
+            <a:pPr marL="342900" indent="-342900">
+              <a:buFont typeface="+mj-lt"/>
+              <a:buAutoNum type="arabicPeriod"/>
             </a:pPr>
             <a:r>
               <a:rPr lang="en-US" sz="1400" dirty="0"/>
@@ -17565,7 +19809,16 @@
               <a:rPr lang="en-US" sz="1400" b="1" dirty="0"/>
               <a:t>warm start</a:t>
             </a:r>
-            <a:endParaRPr lang="en-US" sz="1400" dirty="0"/>
+          </a:p>
+          <a:p>
+            <a:pPr marL="342900" indent="-342900">
+              <a:buFont typeface="+mj-lt"/>
+              <a:buAutoNum type="arabicPeriod"/>
+            </a:pPr>
+            <a:r>
+              <a:rPr lang="en-US" sz="1400" dirty="0"/>
+              <a:t>A spin up time, all output is only generated after this day</a:t>
+            </a:r>
           </a:p>
           <a:p>
             <a:pPr marL="0" indent="0">

</xml_diff>